<commit_message>
Add marker for googlenet arch figure
</commit_message>
<xml_diff>
--- a/slide/graduate.pptx
+++ b/slide/graduate.pptx
@@ -5,7 +5,7 @@
     <p:sldMasterId id="2147483660" r:id="rId1"/>
   </p:sldMasterIdLst>
   <p:notesMasterIdLst>
-    <p:notesMasterId r:id="rId25"/>
+    <p:notesMasterId r:id="rId26"/>
   </p:notesMasterIdLst>
   <p:sldIdLst>
     <p:sldId id="266" r:id="rId2"/>
@@ -17,20 +17,21 @@
     <p:sldId id="260" r:id="rId8"/>
     <p:sldId id="280" r:id="rId9"/>
     <p:sldId id="262" r:id="rId10"/>
-    <p:sldId id="271" r:id="rId11"/>
-    <p:sldId id="272" r:id="rId12"/>
-    <p:sldId id="282" r:id="rId13"/>
-    <p:sldId id="273" r:id="rId14"/>
-    <p:sldId id="263" r:id="rId15"/>
-    <p:sldId id="274" r:id="rId16"/>
-    <p:sldId id="264" r:id="rId17"/>
-    <p:sldId id="277" r:id="rId18"/>
-    <p:sldId id="281" r:id="rId19"/>
-    <p:sldId id="278" r:id="rId20"/>
-    <p:sldId id="265" r:id="rId21"/>
-    <p:sldId id="258" r:id="rId22"/>
-    <p:sldId id="261" r:id="rId23"/>
-    <p:sldId id="275" r:id="rId24"/>
+    <p:sldId id="283" r:id="rId11"/>
+    <p:sldId id="271" r:id="rId12"/>
+    <p:sldId id="272" r:id="rId13"/>
+    <p:sldId id="282" r:id="rId14"/>
+    <p:sldId id="273" r:id="rId15"/>
+    <p:sldId id="263" r:id="rId16"/>
+    <p:sldId id="274" r:id="rId17"/>
+    <p:sldId id="264" r:id="rId18"/>
+    <p:sldId id="277" r:id="rId19"/>
+    <p:sldId id="281" r:id="rId20"/>
+    <p:sldId id="278" r:id="rId21"/>
+    <p:sldId id="265" r:id="rId22"/>
+    <p:sldId id="258" r:id="rId23"/>
+    <p:sldId id="261" r:id="rId24"/>
+    <p:sldId id="275" r:id="rId25"/>
   </p:sldIdLst>
   <p:sldSz cx="9144000" cy="6858000" type="screen4x3"/>
   <p:notesSz cx="6858000" cy="9144000"/>
@@ -231,7 +232,7 @@
           <a:p>
             <a:fld id="{2E551797-1660-7E44-91A9-4005D4906C9D}" type="datetimeFigureOut">
               <a:rPr lang="en-US" smtClean="0"/>
-              <a:t>1/26/18</a:t>
+              <a:t>1/27/18</a:t>
             </a:fld>
             <a:endParaRPr lang="en-US"/>
           </a:p>
@@ -818,7 +819,7 @@
           <a:p>
             <a:fld id="{AF8C3CD4-EC76-BD4C-9E4E-77FD717E9643}" type="slidenum">
               <a:rPr lang="en-US" smtClean="0"/>
-              <a:t>16</a:t>
+              <a:t>17</a:t>
             </a:fld>
             <a:endParaRPr lang="en-US"/>
           </a:p>
@@ -913,7 +914,7 @@
           <a:p>
             <a:fld id="{AF8C3CD4-EC76-BD4C-9E4E-77FD717E9643}" type="slidenum">
               <a:rPr lang="en-US" smtClean="0"/>
-              <a:t>22</a:t>
+              <a:t>23</a:t>
             </a:fld>
             <a:endParaRPr lang="en-US"/>
           </a:p>
@@ -1142,8 +1143,13 @@
               <a:avLst/>
             </a:prstGeom>
             <a:solidFill>
-              <a:srgbClr val="4285F4"/>
+              <a:srgbClr val="EA4335"/>
             </a:solidFill>
+            <a:ln>
+              <a:solidFill>
+                <a:srgbClr val="EA4335"/>
+              </a:solidFill>
+            </a:ln>
           </p:spPr>
           <p:style>
             <a:lnRef idx="2">
@@ -1166,7 +1172,7 @@
             <a:lstStyle/>
             <a:p>
               <a:pPr algn="ctr"/>
-              <a:endParaRPr lang="en-US"/>
+              <a:endParaRPr lang="en-US" dirty="0"/>
             </a:p>
           </p:txBody>
         </p:sp>
@@ -1245,11 +1251,11 @@
               <a:avLst/>
             </a:prstGeom>
             <a:solidFill>
-              <a:srgbClr val="FBBC05"/>
+              <a:srgbClr val="EA4335"/>
             </a:solidFill>
             <a:ln>
               <a:solidFill>
-                <a:srgbClr val="FBBC05"/>
+                <a:srgbClr val="EA4335"/>
               </a:solidFill>
             </a:ln>
           </p:spPr>
@@ -1299,11 +1305,11 @@
               <a:avLst/>
             </a:prstGeom>
             <a:solidFill>
-              <a:srgbClr val="34A853"/>
+              <a:srgbClr val="EA4335"/>
             </a:solidFill>
             <a:ln>
               <a:solidFill>
-                <a:srgbClr val="34A853"/>
+                <a:srgbClr val="EA4335"/>
               </a:solidFill>
             </a:ln>
           </p:spPr>
@@ -2149,10 +2155,10 @@
       </p:sp>
       <p:grpSp>
         <p:nvGrpSpPr>
-          <p:cNvPr id="4" name="Group 3">
+          <p:cNvPr id="12" name="Group 11">
             <a:extLst>
               <a:ext uri="{FF2B5EF4-FFF2-40B4-BE49-F238E27FC236}">
-                <a16:creationId xmlns:a16="http://schemas.microsoft.com/office/drawing/2014/main" id="{33BA6FCC-1C8A-864C-965C-AF94233C850A}"/>
+                <a16:creationId xmlns:a16="http://schemas.microsoft.com/office/drawing/2014/main" id="{C37B63CD-6DF9-994D-9F80-9E079C7036F4}"/>
               </a:ext>
             </a:extLst>
           </p:cNvPr>
@@ -2161,18 +2167,18 @@
         </p:nvGrpSpPr>
         <p:grpSpPr>
           <a:xfrm>
-            <a:off x="5313150" y="6242923"/>
+            <a:off x="5303524" y="6254637"/>
             <a:ext cx="3503592" cy="113262"/>
-            <a:chOff x="5011758" y="6243089"/>
+            <a:chOff x="5666073" y="6007838"/>
             <a:chExt cx="3503592" cy="113262"/>
           </a:xfrm>
         </p:grpSpPr>
         <p:sp>
           <p:nvSpPr>
-            <p:cNvPr id="8" name="Rectangle 7">
+            <p:cNvPr id="13" name="Rectangle 12">
               <a:extLst>
                 <a:ext uri="{FF2B5EF4-FFF2-40B4-BE49-F238E27FC236}">
-                  <a16:creationId xmlns:a16="http://schemas.microsoft.com/office/drawing/2014/main" id="{DDBA916E-696F-A041-A26F-7FECDC50A9A6}"/>
+                  <a16:creationId xmlns:a16="http://schemas.microsoft.com/office/drawing/2014/main" id="{AD775279-6FA8-2549-A9D2-8CE441963F84}"/>
                 </a:ext>
               </a:extLst>
             </p:cNvPr>
@@ -2181,18 +2187,18 @@
           </p:nvSpPr>
           <p:spPr>
             <a:xfrm>
-              <a:off x="5011758" y="6243255"/>
+              <a:off x="5666073" y="6008004"/>
               <a:ext cx="875898" cy="113096"/>
             </a:xfrm>
             <a:prstGeom prst="rect">
               <a:avLst/>
             </a:prstGeom>
             <a:solidFill>
-              <a:srgbClr val="4285F4"/>
+              <a:srgbClr val="EA4335"/>
             </a:solidFill>
             <a:ln>
               <a:solidFill>
-                <a:srgbClr val="4285F4"/>
+                <a:srgbClr val="EA4335"/>
               </a:solidFill>
             </a:ln>
           </p:spPr>
@@ -2217,16 +2223,16 @@
             <a:lstStyle/>
             <a:p>
               <a:pPr algn="ctr"/>
-              <a:endParaRPr lang="en-US"/>
+              <a:endParaRPr lang="en-US" dirty="0"/>
             </a:p>
           </p:txBody>
         </p:sp>
         <p:sp>
           <p:nvSpPr>
-            <p:cNvPr id="9" name="Rectangle 8">
+            <p:cNvPr id="14" name="Rectangle 13">
               <a:extLst>
                 <a:ext uri="{FF2B5EF4-FFF2-40B4-BE49-F238E27FC236}">
-                  <a16:creationId xmlns:a16="http://schemas.microsoft.com/office/drawing/2014/main" id="{68B724F3-7759-6B4D-8887-81623F4B607A}"/>
+                  <a16:creationId xmlns:a16="http://schemas.microsoft.com/office/drawing/2014/main" id="{3A351CFF-05FB-F449-9AEC-62EAD88B9D4D}"/>
                 </a:ext>
               </a:extLst>
             </p:cNvPr>
@@ -2235,7 +2241,7 @@
           </p:nvSpPr>
           <p:spPr>
             <a:xfrm>
-              <a:off x="5887656" y="6243255"/>
+              <a:off x="6541971" y="6008004"/>
               <a:ext cx="875898" cy="113096"/>
             </a:xfrm>
             <a:prstGeom prst="rect">
@@ -2277,10 +2283,10 @@
         </p:sp>
         <p:sp>
           <p:nvSpPr>
-            <p:cNvPr id="10" name="Rectangle 9">
+            <p:cNvPr id="15" name="Rectangle 14">
               <a:extLst>
                 <a:ext uri="{FF2B5EF4-FFF2-40B4-BE49-F238E27FC236}">
-                  <a16:creationId xmlns:a16="http://schemas.microsoft.com/office/drawing/2014/main" id="{FBDC2205-3DFF-F244-82C5-91526F2FBE31}"/>
+                  <a16:creationId xmlns:a16="http://schemas.microsoft.com/office/drawing/2014/main" id="{F893A3A4-0653-CF48-A492-8668396FCE2A}"/>
                 </a:ext>
               </a:extLst>
             </p:cNvPr>
@@ -2289,18 +2295,18 @@
           </p:nvSpPr>
           <p:spPr>
             <a:xfrm>
-              <a:off x="6763554" y="6243089"/>
+              <a:off x="7417869" y="6007838"/>
               <a:ext cx="875898" cy="113096"/>
             </a:xfrm>
             <a:prstGeom prst="rect">
               <a:avLst/>
             </a:prstGeom>
             <a:solidFill>
-              <a:srgbClr val="FBBC05"/>
+              <a:srgbClr val="EA4335"/>
             </a:solidFill>
             <a:ln>
               <a:solidFill>
-                <a:srgbClr val="FBBC05"/>
+                <a:srgbClr val="EA4335"/>
               </a:solidFill>
             </a:ln>
           </p:spPr>
@@ -2331,10 +2337,10 @@
         </p:sp>
         <p:sp>
           <p:nvSpPr>
-            <p:cNvPr id="11" name="Rectangle 10">
+            <p:cNvPr id="16" name="Rectangle 15">
               <a:extLst>
                 <a:ext uri="{FF2B5EF4-FFF2-40B4-BE49-F238E27FC236}">
-                  <a16:creationId xmlns:a16="http://schemas.microsoft.com/office/drawing/2014/main" id="{BCD60AEF-976F-C246-B5C4-93D7EDDD5966}"/>
+                  <a16:creationId xmlns:a16="http://schemas.microsoft.com/office/drawing/2014/main" id="{A9FD83E4-DC7D-544D-B73F-1A1BFD7E9325}"/>
                 </a:ext>
               </a:extLst>
             </p:cNvPr>
@@ -2343,18 +2349,18 @@
           </p:nvSpPr>
           <p:spPr>
             <a:xfrm>
-              <a:off x="7639452" y="6243089"/>
+              <a:off x="8293767" y="6007838"/>
               <a:ext cx="875898" cy="113096"/>
             </a:xfrm>
             <a:prstGeom prst="rect">
               <a:avLst/>
             </a:prstGeom>
             <a:solidFill>
-              <a:srgbClr val="34A853"/>
+              <a:srgbClr val="EA4335"/>
             </a:solidFill>
             <a:ln>
               <a:solidFill>
-                <a:srgbClr val="34A853"/>
+                <a:srgbClr val="EA4335"/>
               </a:solidFill>
             </a:ln>
           </p:spPr>
@@ -3110,10 +3116,10 @@
       </p:sp>
       <p:grpSp>
         <p:nvGrpSpPr>
-          <p:cNvPr id="9" name="Group 8">
+          <p:cNvPr id="14" name="Group 13">
             <a:extLst>
               <a:ext uri="{FF2B5EF4-FFF2-40B4-BE49-F238E27FC236}">
-                <a16:creationId xmlns:a16="http://schemas.microsoft.com/office/drawing/2014/main" id="{314057CE-9976-EC42-BFE3-00013CB82184}"/>
+                <a16:creationId xmlns:a16="http://schemas.microsoft.com/office/drawing/2014/main" id="{C1A16E70-0F1F-3B47-836E-B765569C8E70}"/>
               </a:ext>
             </a:extLst>
           </p:cNvPr>
@@ -3122,18 +3128,18 @@
         </p:nvGrpSpPr>
         <p:grpSpPr>
           <a:xfrm>
-            <a:off x="5313148" y="6252204"/>
+            <a:off x="5313148" y="6247647"/>
             <a:ext cx="3503592" cy="113262"/>
-            <a:chOff x="5011758" y="6243089"/>
+            <a:chOff x="5666073" y="6007838"/>
             <a:chExt cx="3503592" cy="113262"/>
           </a:xfrm>
         </p:grpSpPr>
         <p:sp>
           <p:nvSpPr>
-            <p:cNvPr id="10" name="Rectangle 9">
+            <p:cNvPr id="15" name="Rectangle 14">
               <a:extLst>
                 <a:ext uri="{FF2B5EF4-FFF2-40B4-BE49-F238E27FC236}">
-                  <a16:creationId xmlns:a16="http://schemas.microsoft.com/office/drawing/2014/main" id="{DF4A47B6-6B33-364F-AEA5-36458C450B76}"/>
+                  <a16:creationId xmlns:a16="http://schemas.microsoft.com/office/drawing/2014/main" id="{C065084C-BD71-5A4E-ACE8-F9A74E7FA2A0}"/>
                 </a:ext>
               </a:extLst>
             </p:cNvPr>
@@ -3142,18 +3148,18 @@
           </p:nvSpPr>
           <p:spPr>
             <a:xfrm>
-              <a:off x="5011758" y="6243255"/>
+              <a:off x="5666073" y="6008004"/>
               <a:ext cx="875898" cy="113096"/>
             </a:xfrm>
             <a:prstGeom prst="rect">
               <a:avLst/>
             </a:prstGeom>
             <a:solidFill>
-              <a:srgbClr val="4285F4"/>
+              <a:srgbClr val="EA4335"/>
             </a:solidFill>
             <a:ln>
               <a:solidFill>
-                <a:srgbClr val="4285F4"/>
+                <a:srgbClr val="EA4335"/>
               </a:solidFill>
             </a:ln>
           </p:spPr>
@@ -3178,16 +3184,16 @@
             <a:lstStyle/>
             <a:p>
               <a:pPr algn="ctr"/>
-              <a:endParaRPr lang="en-US"/>
+              <a:endParaRPr lang="en-US" dirty="0"/>
             </a:p>
           </p:txBody>
         </p:sp>
         <p:sp>
           <p:nvSpPr>
-            <p:cNvPr id="11" name="Rectangle 10">
+            <p:cNvPr id="16" name="Rectangle 15">
               <a:extLst>
                 <a:ext uri="{FF2B5EF4-FFF2-40B4-BE49-F238E27FC236}">
-                  <a16:creationId xmlns:a16="http://schemas.microsoft.com/office/drawing/2014/main" id="{F5950ACF-DC41-BB4C-9309-5A6CB7866A01}"/>
+                  <a16:creationId xmlns:a16="http://schemas.microsoft.com/office/drawing/2014/main" id="{6730513A-C3E8-FB49-985B-52DE44D052B2}"/>
                 </a:ext>
               </a:extLst>
             </p:cNvPr>
@@ -3196,7 +3202,7 @@
           </p:nvSpPr>
           <p:spPr>
             <a:xfrm>
-              <a:off x="5887656" y="6243255"/>
+              <a:off x="6541971" y="6008004"/>
               <a:ext cx="875898" cy="113096"/>
             </a:xfrm>
             <a:prstGeom prst="rect">
@@ -3238,10 +3244,10 @@
         </p:sp>
         <p:sp>
           <p:nvSpPr>
-            <p:cNvPr id="12" name="Rectangle 11">
+            <p:cNvPr id="17" name="Rectangle 16">
               <a:extLst>
                 <a:ext uri="{FF2B5EF4-FFF2-40B4-BE49-F238E27FC236}">
-                  <a16:creationId xmlns:a16="http://schemas.microsoft.com/office/drawing/2014/main" id="{948D1DBD-D765-C341-99FD-89087B24F9BB}"/>
+                  <a16:creationId xmlns:a16="http://schemas.microsoft.com/office/drawing/2014/main" id="{7BDAEC16-354B-3E45-A8BB-34066DEE38D5}"/>
                 </a:ext>
               </a:extLst>
             </p:cNvPr>
@@ -3250,18 +3256,18 @@
           </p:nvSpPr>
           <p:spPr>
             <a:xfrm>
-              <a:off x="6763554" y="6243089"/>
+              <a:off x="7417869" y="6007838"/>
               <a:ext cx="875898" cy="113096"/>
             </a:xfrm>
             <a:prstGeom prst="rect">
               <a:avLst/>
             </a:prstGeom>
             <a:solidFill>
-              <a:srgbClr val="FBBC05"/>
+              <a:srgbClr val="EA4335"/>
             </a:solidFill>
             <a:ln>
               <a:solidFill>
-                <a:srgbClr val="FBBC05"/>
+                <a:srgbClr val="EA4335"/>
               </a:solidFill>
             </a:ln>
           </p:spPr>
@@ -3292,10 +3298,10 @@
         </p:sp>
         <p:sp>
           <p:nvSpPr>
-            <p:cNvPr id="13" name="Rectangle 12">
+            <p:cNvPr id="18" name="Rectangle 17">
               <a:extLst>
                 <a:ext uri="{FF2B5EF4-FFF2-40B4-BE49-F238E27FC236}">
-                  <a16:creationId xmlns:a16="http://schemas.microsoft.com/office/drawing/2014/main" id="{577EE9B8-3335-E345-9067-B77D50BE066F}"/>
+                  <a16:creationId xmlns:a16="http://schemas.microsoft.com/office/drawing/2014/main" id="{E1FF3245-BD2C-F84B-8466-A89778845B6A}"/>
                 </a:ext>
               </a:extLst>
             </p:cNvPr>
@@ -3304,18 +3310,18 @@
           </p:nvSpPr>
           <p:spPr>
             <a:xfrm>
-              <a:off x="7639452" y="6243089"/>
+              <a:off x="8293767" y="6007838"/>
               <a:ext cx="875898" cy="113096"/>
             </a:xfrm>
             <a:prstGeom prst="rect">
               <a:avLst/>
             </a:prstGeom>
             <a:solidFill>
-              <a:srgbClr val="34A853"/>
+              <a:srgbClr val="EA4335"/>
             </a:solidFill>
             <a:ln>
               <a:solidFill>
-                <a:srgbClr val="34A853"/>
+                <a:srgbClr val="EA4335"/>
               </a:solidFill>
             </a:ln>
           </p:spPr>
@@ -4922,7 +4928,7 @@
           <p:cNvPr id="2" name="Title 1">
             <a:extLst>
               <a:ext uri="{FF2B5EF4-FFF2-40B4-BE49-F238E27FC236}">
-                <a16:creationId xmlns:a16="http://schemas.microsoft.com/office/drawing/2014/main" id="{55D35CD2-C1AE-6945-8B31-1E78F88BC53B}"/>
+                <a16:creationId xmlns:a16="http://schemas.microsoft.com/office/drawing/2014/main" id="{00659823-9A47-5A4F-BCE5-B32B117DA67E}"/>
               </a:ext>
             </a:extLst>
           </p:cNvPr>
@@ -4940,7 +4946,7 @@
           <a:p>
             <a:r>
               <a:rPr lang="ja-JP" altLang="en-US" dirty="0"/>
-              <a:t>並列化検討</a:t>
+              <a:t>本研究のコントリビューション</a:t>
             </a:r>
             <a:endParaRPr lang="en-US" dirty="0"/>
           </a:p>
@@ -4951,7 +4957,7 @@
           <p:cNvPr id="3" name="Content Placeholder 2">
             <a:extLst>
               <a:ext uri="{FF2B5EF4-FFF2-40B4-BE49-F238E27FC236}">
-                <a16:creationId xmlns:a16="http://schemas.microsoft.com/office/drawing/2014/main" id="{C1CDE55F-1F31-BD41-8A41-27952E4EED34}"/>
+                <a16:creationId xmlns:a16="http://schemas.microsoft.com/office/drawing/2014/main" id="{EAB14B89-0154-464B-A50C-51342609A3B7}"/>
               </a:ext>
             </a:extLst>
           </p:cNvPr>
@@ -4967,46 +4973,59 @@
           <a:bodyPr/>
           <a:lstStyle/>
           <a:p>
-            <a:pPr>
-              <a:lnSpc>
-                <a:spcPct val="100000"/>
-              </a:lnSpc>
-            </a:pPr>
+            <a:r>
+              <a:rPr lang="ja-JP" altLang="en-US" dirty="0"/>
+              <a:t>マルチ</a:t>
+            </a:r>
             <a:r>
               <a:rPr lang="en-US" altLang="ja-JP" dirty="0"/>
+              <a:t>FPGA</a:t>
+            </a:r>
+            <a:r>
+              <a:rPr lang="ja-JP" altLang="en-US" dirty="0"/>
+              <a:t>による</a:t>
+            </a:r>
+            <a:r>
+              <a:rPr lang="en-US" altLang="ja-JP" dirty="0"/>
+              <a:t>CNN</a:t>
+            </a:r>
+            <a:r>
+              <a:rPr lang="ja-JP" altLang="en-US" dirty="0"/>
+              <a:t>アクセラレータ</a:t>
+            </a:r>
+            <a:endParaRPr lang="en-US" altLang="ja-JP" dirty="0"/>
+          </a:p>
+          <a:p>
+            <a:endParaRPr lang="en-US" dirty="0"/>
+          </a:p>
+          <a:p>
+            <a:r>
+              <a:rPr lang="en-US" dirty="0"/>
               <a:t>GoogLeNet</a:t>
             </a:r>
             <a:r>
               <a:rPr lang="ja-JP" altLang="en-US" dirty="0"/>
-              <a:t>の並列化</a:t>
+              <a:t>の</a:t>
+            </a:r>
+            <a:r>
+              <a:rPr lang="en-US" altLang="ja-JP" dirty="0"/>
+              <a:t>FPGA</a:t>
+            </a:r>
+            <a:r>
+              <a:rPr lang="ja-JP" altLang="en-US" dirty="0"/>
+              <a:t>実装</a:t>
             </a:r>
             <a:endParaRPr lang="en-US" altLang="ja-JP" dirty="0"/>
           </a:p>
           <a:p>
-            <a:pPr lvl="1">
-              <a:lnSpc>
-                <a:spcPct val="100000"/>
-              </a:lnSpc>
-            </a:pPr>
-            <a:r>
-              <a:rPr lang="ja-JP" altLang="en-US" dirty="0"/>
-              <a:t>畳み込み演算の並列化</a:t>
-            </a:r>
-            <a:endParaRPr lang="en-US" altLang="ja-JP" dirty="0"/>
-          </a:p>
-          <a:p>
-            <a:pPr lvl="1">
-              <a:lnSpc>
-                <a:spcPct val="100000"/>
-              </a:lnSpc>
-            </a:pPr>
+            <a:pPr lvl="1"/>
             <a:r>
               <a:rPr lang="en-US" altLang="ja-JP" dirty="0"/>
-              <a:t>Inception</a:t>
-            </a:r>
-            <a:r>
-              <a:rPr lang="ja-JP" altLang="en-US" dirty="0"/>
-              <a:t>層の計算スレッド分割</a:t>
+              <a:t>AlexNet</a:t>
+            </a:r>
+            <a:r>
+              <a:rPr lang="ja-JP" altLang="en-US" dirty="0"/>
+              <a:t>が実装対象となりやすい</a:t>
             </a:r>
             <a:endParaRPr lang="en-US" dirty="0"/>
           </a:p>
@@ -5017,7 +5036,7 @@
           <p:cNvPr id="4" name="Slide Number Placeholder 3">
             <a:extLst>
               <a:ext uri="{FF2B5EF4-FFF2-40B4-BE49-F238E27FC236}">
-                <a16:creationId xmlns:a16="http://schemas.microsoft.com/office/drawing/2014/main" id="{A6E64AC7-C6CA-5F42-A510-F4A9D3C7612F}"/>
+                <a16:creationId xmlns:a16="http://schemas.microsoft.com/office/drawing/2014/main" id="{B4B3AE10-1FC2-DF49-B89E-D58156F98724}"/>
               </a:ext>
             </a:extLst>
           </p:cNvPr>
@@ -5037,14 +5056,14 @@
               <a:rPr lang="en-US" smtClean="0"/>
               <a:t>10</a:t>
             </a:fld>
-            <a:endParaRPr lang="en-US"/>
+            <a:endParaRPr lang="en-US" dirty="0"/>
           </a:p>
         </p:txBody>
       </p:sp>
     </p:spTree>
     <p:extLst>
       <p:ext uri="{BB962C8B-B14F-4D97-AF65-F5344CB8AC3E}">
-        <p14:creationId xmlns:p14="http://schemas.microsoft.com/office/powerpoint/2010/main" val="3447425624"/>
+        <p14:creationId xmlns:p14="http://schemas.microsoft.com/office/powerpoint/2010/main" val="1062787650"/>
       </p:ext>
     </p:extLst>
   </p:cSld>
@@ -5094,7 +5113,7 @@
           <a:p>
             <a:r>
               <a:rPr lang="ja-JP" altLang="en-US" dirty="0"/>
-              <a:t>畳み込み演算の並列化</a:t>
+              <a:t>並列化検討</a:t>
             </a:r>
             <a:endParaRPr lang="en-US" dirty="0"/>
           </a:p>
@@ -5121,19 +5140,48 @@
           <a:bodyPr/>
           <a:lstStyle/>
           <a:p>
-            <a:r>
-              <a:rPr lang="ja-JP" altLang="en-US" dirty="0"/>
-              <a:t>畳み込み演算のデータ並列性</a:t>
+            <a:pPr>
+              <a:lnSpc>
+                <a:spcPct val="100000"/>
+              </a:lnSpc>
+            </a:pPr>
+            <a:r>
+              <a:rPr lang="en-US" altLang="ja-JP" dirty="0"/>
+              <a:t>GoogLeNet</a:t>
+            </a:r>
+            <a:r>
+              <a:rPr lang="ja-JP" altLang="en-US" dirty="0"/>
+              <a:t>の並列化</a:t>
             </a:r>
             <a:endParaRPr lang="en-US" altLang="ja-JP" dirty="0"/>
           </a:p>
           <a:p>
-            <a:pPr lvl="1"/>
-            <a:r>
-              <a:rPr lang="ja-JP" altLang="en-US" dirty="0"/>
-              <a:t>出力値分割</a:t>
+            <a:pPr lvl="1">
+              <a:lnSpc>
+                <a:spcPct val="100000"/>
+              </a:lnSpc>
+            </a:pPr>
+            <a:r>
+              <a:rPr lang="ja-JP" altLang="en-US" dirty="0"/>
+              <a:t>畳み込み演算の並列化</a:t>
             </a:r>
             <a:endParaRPr lang="en-US" altLang="ja-JP" dirty="0"/>
+          </a:p>
+          <a:p>
+            <a:pPr lvl="1">
+              <a:lnSpc>
+                <a:spcPct val="100000"/>
+              </a:lnSpc>
+            </a:pPr>
+            <a:r>
+              <a:rPr lang="en-US" altLang="ja-JP" dirty="0"/>
+              <a:t>Inception</a:t>
+            </a:r>
+            <a:r>
+              <a:rPr lang="ja-JP" altLang="en-US" dirty="0"/>
+              <a:t>層の計算スレッド分割</a:t>
+            </a:r>
+            <a:endParaRPr lang="en-US" dirty="0"/>
           </a:p>
         </p:txBody>
       </p:sp>
@@ -5142,7 +5190,7 @@
           <p:cNvPr id="4" name="Slide Number Placeholder 3">
             <a:extLst>
               <a:ext uri="{FF2B5EF4-FFF2-40B4-BE49-F238E27FC236}">
-                <a16:creationId xmlns:a16="http://schemas.microsoft.com/office/drawing/2014/main" id="{815AFDB5-B1D3-8740-9A11-7CD378940FE1}"/>
+                <a16:creationId xmlns:a16="http://schemas.microsoft.com/office/drawing/2014/main" id="{A6E64AC7-C6CA-5F42-A510-F4A9D3C7612F}"/>
               </a:ext>
             </a:extLst>
           </p:cNvPr>
@@ -5169,7 +5217,7 @@
     </p:spTree>
     <p:extLst>
       <p:ext uri="{BB962C8B-B14F-4D97-AF65-F5344CB8AC3E}">
-        <p14:creationId xmlns:p14="http://schemas.microsoft.com/office/powerpoint/2010/main" val="3954525887"/>
+        <p14:creationId xmlns:p14="http://schemas.microsoft.com/office/powerpoint/2010/main" val="3447425624"/>
       </p:ext>
     </p:extLst>
   </p:cSld>
@@ -5286,6 +5334,131 @@
             <a:fld id="{AE60790C-7B88-2D40-A70D-E54200C05D47}" type="slidenum">
               <a:rPr lang="en-US" smtClean="0"/>
               <a:t>12</a:t>
+            </a:fld>
+            <a:endParaRPr lang="en-US"/>
+          </a:p>
+        </p:txBody>
+      </p:sp>
+    </p:spTree>
+    <p:extLst>
+      <p:ext uri="{BB962C8B-B14F-4D97-AF65-F5344CB8AC3E}">
+        <p14:creationId xmlns:p14="http://schemas.microsoft.com/office/powerpoint/2010/main" val="3954525887"/>
+      </p:ext>
+    </p:extLst>
+  </p:cSld>
+  <p:clrMapOvr>
+    <a:masterClrMapping/>
+  </p:clrMapOvr>
+</p:sld>
+</file>
+
+<file path=ppt/slides/slide13.xml><?xml version="1.0" encoding="utf-8"?>
+<p:sld xmlns:a="http://schemas.openxmlformats.org/drawingml/2006/main" xmlns:r="http://schemas.openxmlformats.org/officeDocument/2006/relationships" xmlns:p="http://schemas.openxmlformats.org/presentationml/2006/main">
+  <p:cSld>
+    <p:spTree>
+      <p:nvGrpSpPr>
+        <p:cNvPr id="1" name=""/>
+        <p:cNvGrpSpPr/>
+        <p:nvPr/>
+      </p:nvGrpSpPr>
+      <p:grpSpPr>
+        <a:xfrm>
+          <a:off x="0" y="0"/>
+          <a:ext cx="0" cy="0"/>
+          <a:chOff x="0" y="0"/>
+          <a:chExt cx="0" cy="0"/>
+        </a:xfrm>
+      </p:grpSpPr>
+      <p:sp>
+        <p:nvSpPr>
+          <p:cNvPr id="2" name="Title 1">
+            <a:extLst>
+              <a:ext uri="{FF2B5EF4-FFF2-40B4-BE49-F238E27FC236}">
+                <a16:creationId xmlns:a16="http://schemas.microsoft.com/office/drawing/2014/main" id="{55D35CD2-C1AE-6945-8B31-1E78F88BC53B}"/>
+              </a:ext>
+            </a:extLst>
+          </p:cNvPr>
+          <p:cNvSpPr>
+            <a:spLocks noGrp="1"/>
+          </p:cNvSpPr>
+          <p:nvPr>
+            <p:ph type="title"/>
+          </p:nvPr>
+        </p:nvSpPr>
+        <p:spPr/>
+        <p:txBody>
+          <a:bodyPr/>
+          <a:lstStyle/>
+          <a:p>
+            <a:r>
+              <a:rPr lang="ja-JP" altLang="en-US" dirty="0"/>
+              <a:t>畳み込み演算の並列化</a:t>
+            </a:r>
+            <a:endParaRPr lang="en-US" dirty="0"/>
+          </a:p>
+        </p:txBody>
+      </p:sp>
+      <p:sp>
+        <p:nvSpPr>
+          <p:cNvPr id="3" name="Content Placeholder 2">
+            <a:extLst>
+              <a:ext uri="{FF2B5EF4-FFF2-40B4-BE49-F238E27FC236}">
+                <a16:creationId xmlns:a16="http://schemas.microsoft.com/office/drawing/2014/main" id="{C1CDE55F-1F31-BD41-8A41-27952E4EED34}"/>
+              </a:ext>
+            </a:extLst>
+          </p:cNvPr>
+          <p:cNvSpPr>
+            <a:spLocks noGrp="1"/>
+          </p:cNvSpPr>
+          <p:nvPr>
+            <p:ph idx="1"/>
+          </p:nvPr>
+        </p:nvSpPr>
+        <p:spPr/>
+        <p:txBody>
+          <a:bodyPr/>
+          <a:lstStyle/>
+          <a:p>
+            <a:r>
+              <a:rPr lang="ja-JP" altLang="en-US" dirty="0"/>
+              <a:t>畳み込み演算のデータ並列性</a:t>
+            </a:r>
+            <a:endParaRPr lang="en-US" altLang="ja-JP" dirty="0"/>
+          </a:p>
+          <a:p>
+            <a:pPr lvl="1"/>
+            <a:r>
+              <a:rPr lang="ja-JP" altLang="en-US" dirty="0"/>
+              <a:t>出力値分割</a:t>
+            </a:r>
+            <a:endParaRPr lang="en-US" altLang="ja-JP" dirty="0"/>
+          </a:p>
+        </p:txBody>
+      </p:sp>
+      <p:sp>
+        <p:nvSpPr>
+          <p:cNvPr id="4" name="Slide Number Placeholder 3">
+            <a:extLst>
+              <a:ext uri="{FF2B5EF4-FFF2-40B4-BE49-F238E27FC236}">
+                <a16:creationId xmlns:a16="http://schemas.microsoft.com/office/drawing/2014/main" id="{815AFDB5-B1D3-8740-9A11-7CD378940FE1}"/>
+              </a:ext>
+            </a:extLst>
+          </p:cNvPr>
+          <p:cNvSpPr>
+            <a:spLocks noGrp="1"/>
+          </p:cNvSpPr>
+          <p:nvPr>
+            <p:ph type="sldNum" sz="quarter" idx="12"/>
+          </p:nvPr>
+        </p:nvSpPr>
+        <p:spPr/>
+        <p:txBody>
+          <a:bodyPr/>
+          <a:lstStyle/>
+          <a:p>
+            <a:fld id="{AE60790C-7B88-2D40-A70D-E54200C05D47}" type="slidenum">
+              <a:rPr lang="en-US" smtClean="0"/>
+              <a:t>13</a:t>
             </a:fld>
             <a:endParaRPr lang="en-US"/>
           </a:p>
@@ -5340,7 +5513,7 @@
 </p:sld>
 </file>
 
-<file path=ppt/slides/slide13.xml><?xml version="1.0" encoding="utf-8"?>
+<file path=ppt/slides/slide14.xml><?xml version="1.0" encoding="utf-8"?>
 <p:sld xmlns:a="http://schemas.openxmlformats.org/drawingml/2006/main" xmlns:r="http://schemas.openxmlformats.org/officeDocument/2006/relationships" xmlns:p="http://schemas.openxmlformats.org/presentationml/2006/main">
   <p:cSld>
     <p:spTree>
@@ -5520,7 +5693,7 @@
           <a:p>
             <a:fld id="{AE60790C-7B88-2D40-A70D-E54200C05D47}" type="slidenum">
               <a:rPr lang="en-US" smtClean="0"/>
-              <a:t>13</a:t>
+              <a:t>14</a:t>
             </a:fld>
             <a:endParaRPr lang="en-US"/>
           </a:p>
@@ -5530,222 +5703,6 @@
     <p:extLst>
       <p:ext uri="{BB962C8B-B14F-4D97-AF65-F5344CB8AC3E}">
         <p14:creationId xmlns:p14="http://schemas.microsoft.com/office/powerpoint/2010/main" val="2357790671"/>
-      </p:ext>
-    </p:extLst>
-  </p:cSld>
-  <p:clrMapOvr>
-    <a:masterClrMapping/>
-  </p:clrMapOvr>
-</p:sld>
-</file>
-
-<file path=ppt/slides/slide14.xml><?xml version="1.0" encoding="utf-8"?>
-<p:sld xmlns:a="http://schemas.openxmlformats.org/drawingml/2006/main" xmlns:r="http://schemas.openxmlformats.org/officeDocument/2006/relationships" xmlns:p="http://schemas.openxmlformats.org/presentationml/2006/main">
-  <p:cSld>
-    <p:spTree>
-      <p:nvGrpSpPr>
-        <p:cNvPr id="1" name=""/>
-        <p:cNvGrpSpPr/>
-        <p:nvPr/>
-      </p:nvGrpSpPr>
-      <p:grpSpPr>
-        <a:xfrm>
-          <a:off x="0" y="0"/>
-          <a:ext cx="0" cy="0"/>
-          <a:chOff x="0" y="0"/>
-          <a:chExt cx="0" cy="0"/>
-        </a:xfrm>
-      </p:grpSpPr>
-      <p:sp>
-        <p:nvSpPr>
-          <p:cNvPr id="2" name="Title 1">
-            <a:extLst>
-              <a:ext uri="{FF2B5EF4-FFF2-40B4-BE49-F238E27FC236}">
-                <a16:creationId xmlns:a16="http://schemas.microsoft.com/office/drawing/2014/main" id="{55D35CD2-C1AE-6945-8B31-1E78F88BC53B}"/>
-              </a:ext>
-            </a:extLst>
-          </p:cNvPr>
-          <p:cNvSpPr>
-            <a:spLocks noGrp="1"/>
-          </p:cNvSpPr>
-          <p:nvPr>
-            <p:ph type="title"/>
-          </p:nvPr>
-        </p:nvSpPr>
-        <p:spPr/>
-        <p:txBody>
-          <a:bodyPr/>
-          <a:lstStyle/>
-          <a:p>
-            <a:r>
-              <a:rPr lang="ja-JP" altLang="en-US" dirty="0"/>
-              <a:t>実装</a:t>
-            </a:r>
-            <a:endParaRPr lang="en-US" dirty="0"/>
-          </a:p>
-        </p:txBody>
-      </p:sp>
-      <p:sp>
-        <p:nvSpPr>
-          <p:cNvPr id="3" name="Content Placeholder 2">
-            <a:extLst>
-              <a:ext uri="{FF2B5EF4-FFF2-40B4-BE49-F238E27FC236}">
-                <a16:creationId xmlns:a16="http://schemas.microsoft.com/office/drawing/2014/main" id="{C1CDE55F-1F31-BD41-8A41-27952E4EED34}"/>
-              </a:ext>
-            </a:extLst>
-          </p:cNvPr>
-          <p:cNvSpPr>
-            <a:spLocks noGrp="1"/>
-          </p:cNvSpPr>
-          <p:nvPr>
-            <p:ph idx="1"/>
-          </p:nvPr>
-        </p:nvSpPr>
-        <p:spPr/>
-        <p:txBody>
-          <a:bodyPr>
-            <a:normAutofit/>
-          </a:bodyPr>
-          <a:lstStyle/>
-          <a:p>
-            <a:r>
-              <a:rPr lang="ja-JP" altLang="en-US" dirty="0"/>
-              <a:t>設計方針</a:t>
-            </a:r>
-            <a:endParaRPr lang="en-US" altLang="ja-JP" dirty="0"/>
-          </a:p>
-          <a:p>
-            <a:pPr lvl="1"/>
-            <a:r>
-              <a:rPr lang="en-US" altLang="ja-JP" dirty="0"/>
-              <a:t>Inception</a:t>
-            </a:r>
-            <a:r>
-              <a:rPr lang="ja-JP" altLang="en-US" dirty="0"/>
-              <a:t>層の実装に集中</a:t>
-            </a:r>
-            <a:endParaRPr lang="en-US" altLang="ja-JP" dirty="0"/>
-          </a:p>
-          <a:p>
-            <a:pPr lvl="2"/>
-            <a:r>
-              <a:rPr lang="en-US" dirty="0"/>
-              <a:t>GoogLeNet</a:t>
-            </a:r>
-            <a:r>
-              <a:rPr lang="ja-JP" altLang="en-US" dirty="0"/>
-              <a:t>の大部分を占める</a:t>
-            </a:r>
-            <a:endParaRPr lang="en-US" altLang="ja-JP" dirty="0"/>
-          </a:p>
-          <a:p>
-            <a:pPr lvl="1"/>
-            <a:r>
-              <a:rPr lang="ja-JP" altLang="en-US" dirty="0"/>
-              <a:t>各スレッド毎に</a:t>
-            </a:r>
-            <a:r>
-              <a:rPr lang="en-US" altLang="ja-JP" dirty="0"/>
-              <a:t>FPGA</a:t>
-            </a:r>
-            <a:r>
-              <a:rPr lang="ja-JP" altLang="en-US" dirty="0"/>
-              <a:t>ボードを割り当て</a:t>
-            </a:r>
-            <a:endParaRPr lang="en-US" altLang="ja-JP" dirty="0"/>
-          </a:p>
-          <a:p>
-            <a:pPr lvl="1"/>
-            <a:r>
-              <a:rPr lang="ja-JP" altLang="en-US" dirty="0"/>
-              <a:t>畳み込み演算の出力分割</a:t>
-            </a:r>
-            <a:endParaRPr lang="en-US" altLang="ja-JP" dirty="0"/>
-          </a:p>
-          <a:p>
-            <a:endParaRPr lang="en-US" dirty="0"/>
-          </a:p>
-          <a:p>
-            <a:r>
-              <a:rPr lang="ja-JP" altLang="en-US" dirty="0"/>
-              <a:t>実装環境</a:t>
-            </a:r>
-            <a:endParaRPr lang="en-US" altLang="ja-JP" dirty="0"/>
-          </a:p>
-          <a:p>
-            <a:pPr lvl="1"/>
-            <a:r>
-              <a:rPr lang="en-US" dirty="0" err="1"/>
-              <a:t>Vivado</a:t>
-            </a:r>
-            <a:r>
-              <a:rPr lang="en-US" dirty="0"/>
-              <a:t> HLS(2017.3)</a:t>
-            </a:r>
-            <a:r>
-              <a:rPr lang="ja-JP" altLang="en-US" dirty="0"/>
-              <a:t>による高位合成</a:t>
-            </a:r>
-            <a:endParaRPr lang="en-US" altLang="ja-JP" dirty="0"/>
-          </a:p>
-          <a:p>
-            <a:pPr lvl="1"/>
-            <a:r>
-              <a:rPr lang="en-US" dirty="0"/>
-              <a:t>Xilinx </a:t>
-            </a:r>
-            <a:r>
-              <a:rPr lang="en-US" dirty="0" err="1"/>
-              <a:t>Kintex</a:t>
-            </a:r>
-            <a:r>
-              <a:rPr lang="en-US" dirty="0"/>
-              <a:t> </a:t>
-            </a:r>
-            <a:r>
-              <a:rPr lang="en-US" dirty="0" err="1"/>
-              <a:t>UltraScale</a:t>
-            </a:r>
-            <a:r>
-              <a:rPr lang="en-US" dirty="0"/>
-              <a:t> XCKU095</a:t>
-            </a:r>
-          </a:p>
-        </p:txBody>
-      </p:sp>
-      <p:sp>
-        <p:nvSpPr>
-          <p:cNvPr id="4" name="Slide Number Placeholder 3">
-            <a:extLst>
-              <a:ext uri="{FF2B5EF4-FFF2-40B4-BE49-F238E27FC236}">
-                <a16:creationId xmlns:a16="http://schemas.microsoft.com/office/drawing/2014/main" id="{ACA3287C-A53E-EB46-A0B8-005C55D3A696}"/>
-              </a:ext>
-            </a:extLst>
-          </p:cNvPr>
-          <p:cNvSpPr>
-            <a:spLocks noGrp="1"/>
-          </p:cNvSpPr>
-          <p:nvPr>
-            <p:ph type="sldNum" sz="quarter" idx="12"/>
-          </p:nvPr>
-        </p:nvSpPr>
-        <p:spPr/>
-        <p:txBody>
-          <a:bodyPr/>
-          <a:lstStyle/>
-          <a:p>
-            <a:fld id="{AE60790C-7B88-2D40-A70D-E54200C05D47}" type="slidenum">
-              <a:rPr lang="en-US" smtClean="0"/>
-              <a:t>14</a:t>
-            </a:fld>
-            <a:endParaRPr lang="en-US"/>
-          </a:p>
-        </p:txBody>
-      </p:sp>
-    </p:spTree>
-    <p:extLst>
-      <p:ext uri="{BB962C8B-B14F-4D97-AF65-F5344CB8AC3E}">
-        <p14:creationId xmlns:p14="http://schemas.microsoft.com/office/powerpoint/2010/main" val="2600213477"/>
       </p:ext>
     </p:extLst>
   </p:cSld>
@@ -5777,6 +5734,222 @@
           <p:cNvPr id="2" name="Title 1">
             <a:extLst>
               <a:ext uri="{FF2B5EF4-FFF2-40B4-BE49-F238E27FC236}">
+                <a16:creationId xmlns:a16="http://schemas.microsoft.com/office/drawing/2014/main" id="{55D35CD2-C1AE-6945-8B31-1E78F88BC53B}"/>
+              </a:ext>
+            </a:extLst>
+          </p:cNvPr>
+          <p:cNvSpPr>
+            <a:spLocks noGrp="1"/>
+          </p:cNvSpPr>
+          <p:nvPr>
+            <p:ph type="title"/>
+          </p:nvPr>
+        </p:nvSpPr>
+        <p:spPr/>
+        <p:txBody>
+          <a:bodyPr/>
+          <a:lstStyle/>
+          <a:p>
+            <a:r>
+              <a:rPr lang="ja-JP" altLang="en-US" dirty="0"/>
+              <a:t>実装</a:t>
+            </a:r>
+            <a:endParaRPr lang="en-US" dirty="0"/>
+          </a:p>
+        </p:txBody>
+      </p:sp>
+      <p:sp>
+        <p:nvSpPr>
+          <p:cNvPr id="3" name="Content Placeholder 2">
+            <a:extLst>
+              <a:ext uri="{FF2B5EF4-FFF2-40B4-BE49-F238E27FC236}">
+                <a16:creationId xmlns:a16="http://schemas.microsoft.com/office/drawing/2014/main" id="{C1CDE55F-1F31-BD41-8A41-27952E4EED34}"/>
+              </a:ext>
+            </a:extLst>
+          </p:cNvPr>
+          <p:cNvSpPr>
+            <a:spLocks noGrp="1"/>
+          </p:cNvSpPr>
+          <p:nvPr>
+            <p:ph idx="1"/>
+          </p:nvPr>
+        </p:nvSpPr>
+        <p:spPr/>
+        <p:txBody>
+          <a:bodyPr>
+            <a:normAutofit/>
+          </a:bodyPr>
+          <a:lstStyle/>
+          <a:p>
+            <a:r>
+              <a:rPr lang="ja-JP" altLang="en-US" dirty="0"/>
+              <a:t>設計方針</a:t>
+            </a:r>
+            <a:endParaRPr lang="en-US" altLang="ja-JP" dirty="0"/>
+          </a:p>
+          <a:p>
+            <a:pPr lvl="1"/>
+            <a:r>
+              <a:rPr lang="en-US" altLang="ja-JP" dirty="0"/>
+              <a:t>Inception</a:t>
+            </a:r>
+            <a:r>
+              <a:rPr lang="ja-JP" altLang="en-US" dirty="0"/>
+              <a:t>層の実装に集中</a:t>
+            </a:r>
+            <a:endParaRPr lang="en-US" altLang="ja-JP" dirty="0"/>
+          </a:p>
+          <a:p>
+            <a:pPr lvl="2"/>
+            <a:r>
+              <a:rPr lang="en-US" dirty="0"/>
+              <a:t>GoogLeNet</a:t>
+            </a:r>
+            <a:r>
+              <a:rPr lang="ja-JP" altLang="en-US" dirty="0"/>
+              <a:t>の大部分を占める</a:t>
+            </a:r>
+            <a:endParaRPr lang="en-US" altLang="ja-JP" dirty="0"/>
+          </a:p>
+          <a:p>
+            <a:pPr lvl="1"/>
+            <a:r>
+              <a:rPr lang="ja-JP" altLang="en-US" dirty="0"/>
+              <a:t>各スレッド毎に</a:t>
+            </a:r>
+            <a:r>
+              <a:rPr lang="en-US" altLang="ja-JP" dirty="0"/>
+              <a:t>FPGA</a:t>
+            </a:r>
+            <a:r>
+              <a:rPr lang="ja-JP" altLang="en-US" dirty="0"/>
+              <a:t>ボードを割り当て</a:t>
+            </a:r>
+            <a:endParaRPr lang="en-US" altLang="ja-JP" dirty="0"/>
+          </a:p>
+          <a:p>
+            <a:pPr lvl="1"/>
+            <a:r>
+              <a:rPr lang="ja-JP" altLang="en-US" dirty="0"/>
+              <a:t>畳み込み演算の出力分割</a:t>
+            </a:r>
+            <a:endParaRPr lang="en-US" altLang="ja-JP" dirty="0"/>
+          </a:p>
+          <a:p>
+            <a:endParaRPr lang="en-US" dirty="0"/>
+          </a:p>
+          <a:p>
+            <a:r>
+              <a:rPr lang="ja-JP" altLang="en-US" dirty="0"/>
+              <a:t>実装環境</a:t>
+            </a:r>
+            <a:endParaRPr lang="en-US" altLang="ja-JP" dirty="0"/>
+          </a:p>
+          <a:p>
+            <a:pPr lvl="1"/>
+            <a:r>
+              <a:rPr lang="en-US" dirty="0" err="1"/>
+              <a:t>Vivado</a:t>
+            </a:r>
+            <a:r>
+              <a:rPr lang="en-US" dirty="0"/>
+              <a:t> HLS(2017.3)</a:t>
+            </a:r>
+            <a:r>
+              <a:rPr lang="ja-JP" altLang="en-US" dirty="0"/>
+              <a:t>による高位合成</a:t>
+            </a:r>
+            <a:endParaRPr lang="en-US" altLang="ja-JP" dirty="0"/>
+          </a:p>
+          <a:p>
+            <a:pPr lvl="1"/>
+            <a:r>
+              <a:rPr lang="en-US" dirty="0"/>
+              <a:t>Xilinx </a:t>
+            </a:r>
+            <a:r>
+              <a:rPr lang="en-US" dirty="0" err="1"/>
+              <a:t>Kintex</a:t>
+            </a:r>
+            <a:r>
+              <a:rPr lang="en-US" dirty="0"/>
+              <a:t> </a:t>
+            </a:r>
+            <a:r>
+              <a:rPr lang="en-US" dirty="0" err="1"/>
+              <a:t>UltraScale</a:t>
+            </a:r>
+            <a:r>
+              <a:rPr lang="en-US" dirty="0"/>
+              <a:t> XCKU095</a:t>
+            </a:r>
+          </a:p>
+        </p:txBody>
+      </p:sp>
+      <p:sp>
+        <p:nvSpPr>
+          <p:cNvPr id="4" name="Slide Number Placeholder 3">
+            <a:extLst>
+              <a:ext uri="{FF2B5EF4-FFF2-40B4-BE49-F238E27FC236}">
+                <a16:creationId xmlns:a16="http://schemas.microsoft.com/office/drawing/2014/main" id="{ACA3287C-A53E-EB46-A0B8-005C55D3A696}"/>
+              </a:ext>
+            </a:extLst>
+          </p:cNvPr>
+          <p:cNvSpPr>
+            <a:spLocks noGrp="1"/>
+          </p:cNvSpPr>
+          <p:nvPr>
+            <p:ph type="sldNum" sz="quarter" idx="12"/>
+          </p:nvPr>
+        </p:nvSpPr>
+        <p:spPr/>
+        <p:txBody>
+          <a:bodyPr/>
+          <a:lstStyle/>
+          <a:p>
+            <a:fld id="{AE60790C-7B88-2D40-A70D-E54200C05D47}" type="slidenum">
+              <a:rPr lang="en-US" smtClean="0"/>
+              <a:t>15</a:t>
+            </a:fld>
+            <a:endParaRPr lang="en-US"/>
+          </a:p>
+        </p:txBody>
+      </p:sp>
+    </p:spTree>
+    <p:extLst>
+      <p:ext uri="{BB962C8B-B14F-4D97-AF65-F5344CB8AC3E}">
+        <p14:creationId xmlns:p14="http://schemas.microsoft.com/office/powerpoint/2010/main" val="2600213477"/>
+      </p:ext>
+    </p:extLst>
+  </p:cSld>
+  <p:clrMapOvr>
+    <a:masterClrMapping/>
+  </p:clrMapOvr>
+</p:sld>
+</file>
+
+<file path=ppt/slides/slide16.xml><?xml version="1.0" encoding="utf-8"?>
+<p:sld xmlns:a="http://schemas.openxmlformats.org/drawingml/2006/main" xmlns:r="http://schemas.openxmlformats.org/officeDocument/2006/relationships" xmlns:p="http://schemas.openxmlformats.org/presentationml/2006/main">
+  <p:cSld>
+    <p:spTree>
+      <p:nvGrpSpPr>
+        <p:cNvPr id="1" name=""/>
+        <p:cNvGrpSpPr/>
+        <p:nvPr/>
+      </p:nvGrpSpPr>
+      <p:grpSpPr>
+        <a:xfrm>
+          <a:off x="0" y="0"/>
+          <a:ext cx="0" cy="0"/>
+          <a:chOff x="0" y="0"/>
+          <a:chExt cx="0" cy="0"/>
+        </a:xfrm>
+      </p:grpSpPr>
+      <p:sp>
+        <p:nvSpPr>
+          <p:cNvPr id="2" name="Title 1">
+            <a:extLst>
+              <a:ext uri="{FF2B5EF4-FFF2-40B4-BE49-F238E27FC236}">
                 <a16:creationId xmlns:a16="http://schemas.microsoft.com/office/drawing/2014/main" id="{3809CDF9-ED2C-1444-A8F9-91EE6FB4501E}"/>
               </a:ext>
             </a:extLst>
@@ -5873,7 +6046,7 @@
           <a:p>
             <a:fld id="{AE60790C-7B88-2D40-A70D-E54200C05D47}" type="slidenum">
               <a:rPr lang="en-US" smtClean="0"/>
-              <a:t>15</a:t>
+              <a:t>16</a:t>
             </a:fld>
             <a:endParaRPr lang="en-US"/>
           </a:p>
@@ -6035,168 +6208,6 @@
 </p:sld>
 </file>
 
-<file path=ppt/slides/slide16.xml><?xml version="1.0" encoding="utf-8"?>
-<p:sld xmlns:a="http://schemas.openxmlformats.org/drawingml/2006/main" xmlns:r="http://schemas.openxmlformats.org/officeDocument/2006/relationships" xmlns:p="http://schemas.openxmlformats.org/presentationml/2006/main">
-  <p:cSld>
-    <p:spTree>
-      <p:nvGrpSpPr>
-        <p:cNvPr id="1" name=""/>
-        <p:cNvGrpSpPr/>
-        <p:nvPr/>
-      </p:nvGrpSpPr>
-      <p:grpSpPr>
-        <a:xfrm>
-          <a:off x="0" y="0"/>
-          <a:ext cx="0" cy="0"/>
-          <a:chOff x="0" y="0"/>
-          <a:chExt cx="0" cy="0"/>
-        </a:xfrm>
-      </p:grpSpPr>
-      <p:sp>
-        <p:nvSpPr>
-          <p:cNvPr id="2" name="Title 1">
-            <a:extLst>
-              <a:ext uri="{FF2B5EF4-FFF2-40B4-BE49-F238E27FC236}">
-                <a16:creationId xmlns:a16="http://schemas.microsoft.com/office/drawing/2014/main" id="{55D35CD2-C1AE-6945-8B31-1E78F88BC53B}"/>
-              </a:ext>
-            </a:extLst>
-          </p:cNvPr>
-          <p:cNvSpPr>
-            <a:spLocks noGrp="1"/>
-          </p:cNvSpPr>
-          <p:nvPr>
-            <p:ph type="title"/>
-          </p:nvPr>
-        </p:nvSpPr>
-        <p:spPr/>
-        <p:txBody>
-          <a:bodyPr/>
-          <a:lstStyle/>
-          <a:p>
-            <a:r>
-              <a:rPr lang="ja-JP" altLang="en-US" dirty="0"/>
-              <a:t>評価</a:t>
-            </a:r>
-            <a:endParaRPr lang="en-US" dirty="0"/>
-          </a:p>
-        </p:txBody>
-      </p:sp>
-      <p:sp>
-        <p:nvSpPr>
-          <p:cNvPr id="3" name="Content Placeholder 2">
-            <a:extLst>
-              <a:ext uri="{FF2B5EF4-FFF2-40B4-BE49-F238E27FC236}">
-                <a16:creationId xmlns:a16="http://schemas.microsoft.com/office/drawing/2014/main" id="{C1CDE55F-1F31-BD41-8A41-27952E4EED34}"/>
-              </a:ext>
-            </a:extLst>
-          </p:cNvPr>
-          <p:cNvSpPr>
-            <a:spLocks noGrp="1"/>
-          </p:cNvSpPr>
-          <p:nvPr>
-            <p:ph idx="1"/>
-          </p:nvPr>
-        </p:nvSpPr>
-        <p:spPr/>
-        <p:txBody>
-          <a:bodyPr/>
-          <a:lstStyle/>
-          <a:p>
-            <a:r>
-              <a:rPr lang="ja-JP" altLang="en-US" dirty="0"/>
-              <a:t>比較対象</a:t>
-            </a:r>
-            <a:endParaRPr lang="en-US" altLang="ja-JP" dirty="0"/>
-          </a:p>
-          <a:p>
-            <a:pPr lvl="1"/>
-            <a:r>
-              <a:rPr lang="en-US" altLang="ja-JP" dirty="0"/>
-              <a:t>Intel(R) Xeon(R) E5-2667 0 @ 2.90GHz </a:t>
-            </a:r>
-          </a:p>
-          <a:p>
-            <a:pPr lvl="1"/>
-            <a:r>
-              <a:rPr lang="en-US" altLang="ja-JP" dirty="0"/>
-              <a:t>Raspberry Pie3</a:t>
-            </a:r>
-          </a:p>
-          <a:p>
-            <a:r>
-              <a:rPr lang="ja-JP" altLang="en-US" dirty="0"/>
-              <a:t>開発環境</a:t>
-            </a:r>
-            <a:endParaRPr lang="en-US" altLang="ja-JP" dirty="0"/>
-          </a:p>
-          <a:p>
-            <a:pPr lvl="1"/>
-            <a:r>
-              <a:rPr lang="en-US" altLang="ja-JP" dirty="0"/>
-              <a:t>g++4.6.3</a:t>
-            </a:r>
-            <a:r>
-              <a:rPr lang="ja-JP" altLang="en-US" dirty="0"/>
-              <a:t>において</a:t>
-            </a:r>
-            <a:r>
-              <a:rPr lang="en-US" altLang="ja-JP" dirty="0"/>
-              <a:t>O3</a:t>
-            </a:r>
-            <a:r>
-              <a:rPr lang="ja-JP" altLang="en-US" dirty="0"/>
-              <a:t>最適化</a:t>
-            </a:r>
-            <a:endParaRPr lang="en-US" altLang="ja-JP" dirty="0"/>
-          </a:p>
-          <a:p>
-            <a:pPr lvl="1"/>
-            <a:endParaRPr lang="en-US" dirty="0"/>
-          </a:p>
-        </p:txBody>
-      </p:sp>
-      <p:sp>
-        <p:nvSpPr>
-          <p:cNvPr id="4" name="Slide Number Placeholder 3">
-            <a:extLst>
-              <a:ext uri="{FF2B5EF4-FFF2-40B4-BE49-F238E27FC236}">
-                <a16:creationId xmlns:a16="http://schemas.microsoft.com/office/drawing/2014/main" id="{BF929231-4E80-F24F-8FF3-264EAD4CE92B}"/>
-              </a:ext>
-            </a:extLst>
-          </p:cNvPr>
-          <p:cNvSpPr>
-            <a:spLocks noGrp="1"/>
-          </p:cNvSpPr>
-          <p:nvPr>
-            <p:ph type="sldNum" sz="quarter" idx="12"/>
-          </p:nvPr>
-        </p:nvSpPr>
-        <p:spPr/>
-        <p:txBody>
-          <a:bodyPr/>
-          <a:lstStyle/>
-          <a:p>
-            <a:fld id="{AE60790C-7B88-2D40-A70D-E54200C05D47}" type="slidenum">
-              <a:rPr lang="en-US" smtClean="0"/>
-              <a:t>16</a:t>
-            </a:fld>
-            <a:endParaRPr lang="en-US"/>
-          </a:p>
-        </p:txBody>
-      </p:sp>
-    </p:spTree>
-    <p:extLst>
-      <p:ext uri="{BB962C8B-B14F-4D97-AF65-F5344CB8AC3E}">
-        <p14:creationId xmlns:p14="http://schemas.microsoft.com/office/powerpoint/2010/main" val="1240456588"/>
-      </p:ext>
-    </p:extLst>
-  </p:cSld>
-  <p:clrMapOvr>
-    <a:masterClrMapping/>
-  </p:clrMapOvr>
-</p:sld>
-</file>
-
 <file path=ppt/slides/slide17.xml><?xml version="1.0" encoding="utf-8"?>
 <p:sld xmlns:a="http://schemas.openxmlformats.org/drawingml/2006/main" xmlns:r="http://schemas.openxmlformats.org/officeDocument/2006/relationships" xmlns:p="http://schemas.openxmlformats.org/presentationml/2006/main">
   <p:cSld>
@@ -6237,7 +6248,7 @@
           <a:p>
             <a:r>
               <a:rPr lang="ja-JP" altLang="en-US" dirty="0"/>
-              <a:t>ベンチマーク</a:t>
+              <a:t>評価</a:t>
             </a:r>
             <a:endParaRPr lang="en-US" dirty="0"/>
           </a:p>
@@ -6265,6 +6276,168 @@
           <a:lstStyle/>
           <a:p>
             <a:r>
+              <a:rPr lang="ja-JP" altLang="en-US" dirty="0"/>
+              <a:t>比較対象</a:t>
+            </a:r>
+            <a:endParaRPr lang="en-US" altLang="ja-JP" dirty="0"/>
+          </a:p>
+          <a:p>
+            <a:pPr lvl="1"/>
+            <a:r>
+              <a:rPr lang="en-US" altLang="ja-JP" dirty="0"/>
+              <a:t>Intel(R) Xeon(R) E5-2667 0 @ 2.90GHz </a:t>
+            </a:r>
+          </a:p>
+          <a:p>
+            <a:pPr lvl="1"/>
+            <a:r>
+              <a:rPr lang="en-US" altLang="ja-JP" dirty="0"/>
+              <a:t>Raspberry Pie3</a:t>
+            </a:r>
+          </a:p>
+          <a:p>
+            <a:r>
+              <a:rPr lang="ja-JP" altLang="en-US" dirty="0"/>
+              <a:t>開発環境</a:t>
+            </a:r>
+            <a:endParaRPr lang="en-US" altLang="ja-JP" dirty="0"/>
+          </a:p>
+          <a:p>
+            <a:pPr lvl="1"/>
+            <a:r>
+              <a:rPr lang="en-US" altLang="ja-JP" dirty="0"/>
+              <a:t>g++4.6.3</a:t>
+            </a:r>
+            <a:r>
+              <a:rPr lang="ja-JP" altLang="en-US" dirty="0"/>
+              <a:t>において</a:t>
+            </a:r>
+            <a:r>
+              <a:rPr lang="en-US" altLang="ja-JP" dirty="0"/>
+              <a:t>O3</a:t>
+            </a:r>
+            <a:r>
+              <a:rPr lang="ja-JP" altLang="en-US" dirty="0"/>
+              <a:t>最適化</a:t>
+            </a:r>
+            <a:endParaRPr lang="en-US" altLang="ja-JP" dirty="0"/>
+          </a:p>
+          <a:p>
+            <a:pPr lvl="1"/>
+            <a:endParaRPr lang="en-US" dirty="0"/>
+          </a:p>
+        </p:txBody>
+      </p:sp>
+      <p:sp>
+        <p:nvSpPr>
+          <p:cNvPr id="4" name="Slide Number Placeholder 3">
+            <a:extLst>
+              <a:ext uri="{FF2B5EF4-FFF2-40B4-BE49-F238E27FC236}">
+                <a16:creationId xmlns:a16="http://schemas.microsoft.com/office/drawing/2014/main" id="{BF929231-4E80-F24F-8FF3-264EAD4CE92B}"/>
+              </a:ext>
+            </a:extLst>
+          </p:cNvPr>
+          <p:cNvSpPr>
+            <a:spLocks noGrp="1"/>
+          </p:cNvSpPr>
+          <p:nvPr>
+            <p:ph type="sldNum" sz="quarter" idx="12"/>
+          </p:nvPr>
+        </p:nvSpPr>
+        <p:spPr/>
+        <p:txBody>
+          <a:bodyPr/>
+          <a:lstStyle/>
+          <a:p>
+            <a:fld id="{AE60790C-7B88-2D40-A70D-E54200C05D47}" type="slidenum">
+              <a:rPr lang="en-US" smtClean="0"/>
+              <a:t>17</a:t>
+            </a:fld>
+            <a:endParaRPr lang="en-US"/>
+          </a:p>
+        </p:txBody>
+      </p:sp>
+    </p:spTree>
+    <p:extLst>
+      <p:ext uri="{BB962C8B-B14F-4D97-AF65-F5344CB8AC3E}">
+        <p14:creationId xmlns:p14="http://schemas.microsoft.com/office/powerpoint/2010/main" val="1240456588"/>
+      </p:ext>
+    </p:extLst>
+  </p:cSld>
+  <p:clrMapOvr>
+    <a:masterClrMapping/>
+  </p:clrMapOvr>
+</p:sld>
+</file>
+
+<file path=ppt/slides/slide18.xml><?xml version="1.0" encoding="utf-8"?>
+<p:sld xmlns:a="http://schemas.openxmlformats.org/drawingml/2006/main" xmlns:r="http://schemas.openxmlformats.org/officeDocument/2006/relationships" xmlns:p="http://schemas.openxmlformats.org/presentationml/2006/main">
+  <p:cSld>
+    <p:spTree>
+      <p:nvGrpSpPr>
+        <p:cNvPr id="1" name=""/>
+        <p:cNvGrpSpPr/>
+        <p:nvPr/>
+      </p:nvGrpSpPr>
+      <p:grpSpPr>
+        <a:xfrm>
+          <a:off x="0" y="0"/>
+          <a:ext cx="0" cy="0"/>
+          <a:chOff x="0" y="0"/>
+          <a:chExt cx="0" cy="0"/>
+        </a:xfrm>
+      </p:grpSpPr>
+      <p:sp>
+        <p:nvSpPr>
+          <p:cNvPr id="2" name="Title 1">
+            <a:extLst>
+              <a:ext uri="{FF2B5EF4-FFF2-40B4-BE49-F238E27FC236}">
+                <a16:creationId xmlns:a16="http://schemas.microsoft.com/office/drawing/2014/main" id="{55D35CD2-C1AE-6945-8B31-1E78F88BC53B}"/>
+              </a:ext>
+            </a:extLst>
+          </p:cNvPr>
+          <p:cNvSpPr>
+            <a:spLocks noGrp="1"/>
+          </p:cNvSpPr>
+          <p:nvPr>
+            <p:ph type="title"/>
+          </p:nvPr>
+        </p:nvSpPr>
+        <p:spPr/>
+        <p:txBody>
+          <a:bodyPr/>
+          <a:lstStyle/>
+          <a:p>
+            <a:r>
+              <a:rPr lang="ja-JP" altLang="en-US" dirty="0"/>
+              <a:t>ベンチマーク</a:t>
+            </a:r>
+            <a:endParaRPr lang="en-US" dirty="0"/>
+          </a:p>
+        </p:txBody>
+      </p:sp>
+      <p:sp>
+        <p:nvSpPr>
+          <p:cNvPr id="3" name="Content Placeholder 2">
+            <a:extLst>
+              <a:ext uri="{FF2B5EF4-FFF2-40B4-BE49-F238E27FC236}">
+                <a16:creationId xmlns:a16="http://schemas.microsoft.com/office/drawing/2014/main" id="{C1CDE55F-1F31-BD41-8A41-27952E4EED34}"/>
+              </a:ext>
+            </a:extLst>
+          </p:cNvPr>
+          <p:cNvSpPr>
+            <a:spLocks noGrp="1"/>
+          </p:cNvSpPr>
+          <p:nvPr>
+            <p:ph idx="1"/>
+          </p:nvPr>
+        </p:nvSpPr>
+        <p:spPr/>
+        <p:txBody>
+          <a:bodyPr/>
+          <a:lstStyle/>
+          <a:p>
+            <a:r>
               <a:rPr lang="en-US" altLang="ja-JP" dirty="0"/>
               <a:t>Inception(3a)</a:t>
             </a:r>
@@ -6325,7 +6498,7 @@
           <a:p>
             <a:fld id="{AE60790C-7B88-2D40-A70D-E54200C05D47}" type="slidenum">
               <a:rPr lang="en-US" smtClean="0"/>
-              <a:t>17</a:t>
+              <a:t>18</a:t>
             </a:fld>
             <a:endParaRPr lang="en-US"/>
           </a:p>
@@ -6847,7 +7020,7 @@
 </p:sld>
 </file>
 
-<file path=ppt/slides/slide18.xml><?xml version="1.0" encoding="utf-8"?>
+<file path=ppt/slides/slide19.xml><?xml version="1.0" encoding="utf-8"?>
 <p:sld xmlns:a="http://schemas.openxmlformats.org/drawingml/2006/main" xmlns:r="http://schemas.openxmlformats.org/officeDocument/2006/relationships" xmlns:p="http://schemas.openxmlformats.org/presentationml/2006/main">
   <p:cSld>
     <p:spTree>
@@ -6957,7 +7130,7 @@
           <a:p>
             <a:fld id="{AE60790C-7B88-2D40-A70D-E54200C05D47}" type="slidenum">
               <a:rPr lang="en-US" smtClean="0"/>
-              <a:t>18</a:t>
+              <a:t>19</a:t>
             </a:fld>
             <a:endParaRPr lang="en-US" dirty="0"/>
           </a:p>
@@ -7564,7 +7737,7 @@
 </p:sld>
 </file>
 
-<file path=ppt/slides/slide19.xml><?xml version="1.0" encoding="utf-8"?>
+<file path=ppt/slides/slide2.xml><?xml version="1.0" encoding="utf-8"?>
 <p:sld xmlns:a="http://schemas.openxmlformats.org/drawingml/2006/main" xmlns:r="http://schemas.openxmlformats.org/officeDocument/2006/relationships" xmlns:p="http://schemas.openxmlformats.org/presentationml/2006/main">
   <p:cSld>
     <p:spTree>
@@ -7586,6 +7759,180 @@
           <p:cNvPr id="2" name="Title 1">
             <a:extLst>
               <a:ext uri="{FF2B5EF4-FFF2-40B4-BE49-F238E27FC236}">
+                <a16:creationId xmlns:a16="http://schemas.microsoft.com/office/drawing/2014/main" id="{39CF3F23-2F48-2645-9777-637A1891861E}"/>
+              </a:ext>
+            </a:extLst>
+          </p:cNvPr>
+          <p:cNvSpPr>
+            <a:spLocks noGrp="1"/>
+          </p:cNvSpPr>
+          <p:nvPr>
+            <p:ph type="title"/>
+          </p:nvPr>
+        </p:nvSpPr>
+        <p:spPr/>
+        <p:txBody>
+          <a:bodyPr/>
+          <a:lstStyle/>
+          <a:p>
+            <a:r>
+              <a:rPr lang="ja-JP" altLang="en-US" dirty="0"/>
+              <a:t>アウトライン</a:t>
+            </a:r>
+            <a:endParaRPr lang="en-US" dirty="0"/>
+          </a:p>
+        </p:txBody>
+      </p:sp>
+      <p:sp>
+        <p:nvSpPr>
+          <p:cNvPr id="3" name="Content Placeholder 2">
+            <a:extLst>
+              <a:ext uri="{FF2B5EF4-FFF2-40B4-BE49-F238E27FC236}">
+                <a16:creationId xmlns:a16="http://schemas.microsoft.com/office/drawing/2014/main" id="{24779C7E-8343-C346-AF74-51042A369AD4}"/>
+              </a:ext>
+            </a:extLst>
+          </p:cNvPr>
+          <p:cNvSpPr>
+            <a:spLocks noGrp="1"/>
+          </p:cNvSpPr>
+          <p:nvPr>
+            <p:ph idx="1"/>
+          </p:nvPr>
+        </p:nvSpPr>
+        <p:spPr/>
+        <p:txBody>
+          <a:bodyPr>
+            <a:normAutofit/>
+          </a:bodyPr>
+          <a:lstStyle/>
+          <a:p>
+            <a:r>
+              <a:rPr lang="ja-JP" altLang="en-US" dirty="0"/>
+              <a:t>背景</a:t>
+            </a:r>
+            <a:endParaRPr lang="en-US" altLang="ja-JP" dirty="0"/>
+          </a:p>
+          <a:p>
+            <a:r>
+              <a:rPr lang="en-US" altLang="ja-JP" dirty="0"/>
+              <a:t>GoogLeNet</a:t>
+            </a:r>
+          </a:p>
+          <a:p>
+            <a:r>
+              <a:rPr lang="en-US" altLang="ja-JP" dirty="0" err="1"/>
+              <a:t>FiC</a:t>
+            </a:r>
+            <a:r>
+              <a:rPr lang="en-US" altLang="ja-JP" dirty="0"/>
+              <a:t>-SW</a:t>
+            </a:r>
+          </a:p>
+          <a:p>
+            <a:r>
+              <a:rPr lang="ja-JP" altLang="en-US" dirty="0"/>
+              <a:t>関連研究</a:t>
+            </a:r>
+            <a:endParaRPr lang="en-US" altLang="ja-JP" dirty="0"/>
+          </a:p>
+          <a:p>
+            <a:r>
+              <a:rPr lang="en-US" altLang="ja-JP" dirty="0"/>
+              <a:t>GoogLeNet</a:t>
+            </a:r>
+            <a:r>
+              <a:rPr lang="ja-JP" altLang="en-US" dirty="0"/>
+              <a:t>並列化検討</a:t>
+            </a:r>
+            <a:endParaRPr lang="en-US" altLang="ja-JP" dirty="0"/>
+          </a:p>
+          <a:p>
+            <a:r>
+              <a:rPr lang="ja-JP" altLang="en-US" dirty="0"/>
+              <a:t>実装</a:t>
+            </a:r>
+            <a:endParaRPr lang="en-US" altLang="ja-JP" dirty="0"/>
+          </a:p>
+          <a:p>
+            <a:r>
+              <a:rPr lang="ja-JP" altLang="en-US" dirty="0"/>
+              <a:t>評価</a:t>
+            </a:r>
+            <a:endParaRPr lang="en-US" altLang="ja-JP" dirty="0"/>
+          </a:p>
+          <a:p>
+            <a:r>
+              <a:rPr lang="ja-JP" altLang="en-US" dirty="0"/>
+              <a:t>結論</a:t>
+            </a:r>
+            <a:endParaRPr lang="en-US" dirty="0"/>
+          </a:p>
+        </p:txBody>
+      </p:sp>
+      <p:sp>
+        <p:nvSpPr>
+          <p:cNvPr id="4" name="Slide Number Placeholder 3">
+            <a:extLst>
+              <a:ext uri="{FF2B5EF4-FFF2-40B4-BE49-F238E27FC236}">
+                <a16:creationId xmlns:a16="http://schemas.microsoft.com/office/drawing/2014/main" id="{91F23C09-84CF-5D49-924E-1F5C9B17F198}"/>
+              </a:ext>
+            </a:extLst>
+          </p:cNvPr>
+          <p:cNvSpPr>
+            <a:spLocks noGrp="1"/>
+          </p:cNvSpPr>
+          <p:nvPr>
+            <p:ph type="sldNum" sz="quarter" idx="12"/>
+          </p:nvPr>
+        </p:nvSpPr>
+        <p:spPr/>
+        <p:txBody>
+          <a:bodyPr/>
+          <a:lstStyle/>
+          <a:p>
+            <a:fld id="{AE60790C-7B88-2D40-A70D-E54200C05D47}" type="slidenum">
+              <a:rPr lang="en-US" smtClean="0"/>
+              <a:t>2</a:t>
+            </a:fld>
+            <a:endParaRPr lang="en-US"/>
+          </a:p>
+        </p:txBody>
+      </p:sp>
+    </p:spTree>
+    <p:extLst>
+      <p:ext uri="{BB962C8B-B14F-4D97-AF65-F5344CB8AC3E}">
+        <p14:creationId xmlns:p14="http://schemas.microsoft.com/office/powerpoint/2010/main" val="317803870"/>
+      </p:ext>
+    </p:extLst>
+  </p:cSld>
+  <p:clrMapOvr>
+    <a:masterClrMapping/>
+  </p:clrMapOvr>
+</p:sld>
+</file>
+
+<file path=ppt/slides/slide20.xml><?xml version="1.0" encoding="utf-8"?>
+<p:sld xmlns:a="http://schemas.openxmlformats.org/drawingml/2006/main" xmlns:r="http://schemas.openxmlformats.org/officeDocument/2006/relationships" xmlns:p="http://schemas.openxmlformats.org/presentationml/2006/main">
+  <p:cSld>
+    <p:spTree>
+      <p:nvGrpSpPr>
+        <p:cNvPr id="1" name=""/>
+        <p:cNvGrpSpPr/>
+        <p:nvPr/>
+      </p:nvGrpSpPr>
+      <p:grpSpPr>
+        <a:xfrm>
+          <a:off x="0" y="0"/>
+          <a:ext cx="0" cy="0"/>
+          <a:chOff x="0" y="0"/>
+          <a:chExt cx="0" cy="0"/>
+        </a:xfrm>
+      </p:grpSpPr>
+      <p:sp>
+        <p:nvSpPr>
+          <p:cNvPr id="2" name="Title 1">
+            <a:extLst>
+              <a:ext uri="{FF2B5EF4-FFF2-40B4-BE49-F238E27FC236}">
                 <a16:creationId xmlns:a16="http://schemas.microsoft.com/office/drawing/2014/main" id="{FFBEF715-800A-BF47-9570-C939FC642B67}"/>
               </a:ext>
             </a:extLst>
@@ -7676,7 +8023,7 @@
           <a:p>
             <a:fld id="{AE60790C-7B88-2D40-A70D-E54200C05D47}" type="slidenum">
               <a:rPr lang="en-US" smtClean="0"/>
-              <a:t>19</a:t>
+              <a:t>20</a:t>
             </a:fld>
             <a:endParaRPr lang="en-US"/>
           </a:p>
@@ -8239,7 +8586,7 @@
 </p:sld>
 </file>
 
-<file path=ppt/slides/slide2.xml><?xml version="1.0" encoding="utf-8"?>
+<file path=ppt/slides/slide21.xml><?xml version="1.0" encoding="utf-8"?>
 <p:sld xmlns:a="http://schemas.openxmlformats.org/drawingml/2006/main" xmlns:r="http://schemas.openxmlformats.org/officeDocument/2006/relationships" xmlns:p="http://schemas.openxmlformats.org/presentationml/2006/main">
   <p:cSld>
     <p:spTree>
@@ -8261,180 +8608,6 @@
           <p:cNvPr id="2" name="Title 1">
             <a:extLst>
               <a:ext uri="{FF2B5EF4-FFF2-40B4-BE49-F238E27FC236}">
-                <a16:creationId xmlns:a16="http://schemas.microsoft.com/office/drawing/2014/main" id="{39CF3F23-2F48-2645-9777-637A1891861E}"/>
-              </a:ext>
-            </a:extLst>
-          </p:cNvPr>
-          <p:cNvSpPr>
-            <a:spLocks noGrp="1"/>
-          </p:cNvSpPr>
-          <p:nvPr>
-            <p:ph type="title"/>
-          </p:nvPr>
-        </p:nvSpPr>
-        <p:spPr/>
-        <p:txBody>
-          <a:bodyPr/>
-          <a:lstStyle/>
-          <a:p>
-            <a:r>
-              <a:rPr lang="ja-JP" altLang="en-US" dirty="0"/>
-              <a:t>アウトライン</a:t>
-            </a:r>
-            <a:endParaRPr lang="en-US" dirty="0"/>
-          </a:p>
-        </p:txBody>
-      </p:sp>
-      <p:sp>
-        <p:nvSpPr>
-          <p:cNvPr id="3" name="Content Placeholder 2">
-            <a:extLst>
-              <a:ext uri="{FF2B5EF4-FFF2-40B4-BE49-F238E27FC236}">
-                <a16:creationId xmlns:a16="http://schemas.microsoft.com/office/drawing/2014/main" id="{24779C7E-8343-C346-AF74-51042A369AD4}"/>
-              </a:ext>
-            </a:extLst>
-          </p:cNvPr>
-          <p:cNvSpPr>
-            <a:spLocks noGrp="1"/>
-          </p:cNvSpPr>
-          <p:nvPr>
-            <p:ph idx="1"/>
-          </p:nvPr>
-        </p:nvSpPr>
-        <p:spPr/>
-        <p:txBody>
-          <a:bodyPr>
-            <a:normAutofit/>
-          </a:bodyPr>
-          <a:lstStyle/>
-          <a:p>
-            <a:r>
-              <a:rPr lang="ja-JP" altLang="en-US" dirty="0"/>
-              <a:t>背景</a:t>
-            </a:r>
-            <a:endParaRPr lang="en-US" altLang="ja-JP" dirty="0"/>
-          </a:p>
-          <a:p>
-            <a:r>
-              <a:rPr lang="en-US" altLang="ja-JP" dirty="0"/>
-              <a:t>GoogLeNet</a:t>
-            </a:r>
-          </a:p>
-          <a:p>
-            <a:r>
-              <a:rPr lang="en-US" altLang="ja-JP" dirty="0" err="1"/>
-              <a:t>FiC</a:t>
-            </a:r>
-            <a:r>
-              <a:rPr lang="en-US" altLang="ja-JP" dirty="0"/>
-              <a:t>-SW</a:t>
-            </a:r>
-          </a:p>
-          <a:p>
-            <a:r>
-              <a:rPr lang="ja-JP" altLang="en-US" dirty="0"/>
-              <a:t>関連研究</a:t>
-            </a:r>
-            <a:endParaRPr lang="en-US" altLang="ja-JP" dirty="0"/>
-          </a:p>
-          <a:p>
-            <a:r>
-              <a:rPr lang="en-US" altLang="ja-JP" dirty="0"/>
-              <a:t>GoogLeNet</a:t>
-            </a:r>
-            <a:r>
-              <a:rPr lang="ja-JP" altLang="en-US" dirty="0"/>
-              <a:t>並列化検討</a:t>
-            </a:r>
-            <a:endParaRPr lang="en-US" altLang="ja-JP" dirty="0"/>
-          </a:p>
-          <a:p>
-            <a:r>
-              <a:rPr lang="ja-JP" altLang="en-US" dirty="0"/>
-              <a:t>実装</a:t>
-            </a:r>
-            <a:endParaRPr lang="en-US" altLang="ja-JP" dirty="0"/>
-          </a:p>
-          <a:p>
-            <a:r>
-              <a:rPr lang="ja-JP" altLang="en-US" dirty="0"/>
-              <a:t>評価</a:t>
-            </a:r>
-            <a:endParaRPr lang="en-US" altLang="ja-JP" dirty="0"/>
-          </a:p>
-          <a:p>
-            <a:r>
-              <a:rPr lang="ja-JP" altLang="en-US" dirty="0"/>
-              <a:t>結論</a:t>
-            </a:r>
-            <a:endParaRPr lang="en-US" dirty="0"/>
-          </a:p>
-        </p:txBody>
-      </p:sp>
-      <p:sp>
-        <p:nvSpPr>
-          <p:cNvPr id="4" name="Slide Number Placeholder 3">
-            <a:extLst>
-              <a:ext uri="{FF2B5EF4-FFF2-40B4-BE49-F238E27FC236}">
-                <a16:creationId xmlns:a16="http://schemas.microsoft.com/office/drawing/2014/main" id="{91F23C09-84CF-5D49-924E-1F5C9B17F198}"/>
-              </a:ext>
-            </a:extLst>
-          </p:cNvPr>
-          <p:cNvSpPr>
-            <a:spLocks noGrp="1"/>
-          </p:cNvSpPr>
-          <p:nvPr>
-            <p:ph type="sldNum" sz="quarter" idx="12"/>
-          </p:nvPr>
-        </p:nvSpPr>
-        <p:spPr/>
-        <p:txBody>
-          <a:bodyPr/>
-          <a:lstStyle/>
-          <a:p>
-            <a:fld id="{AE60790C-7B88-2D40-A70D-E54200C05D47}" type="slidenum">
-              <a:rPr lang="en-US" smtClean="0"/>
-              <a:t>2</a:t>
-            </a:fld>
-            <a:endParaRPr lang="en-US"/>
-          </a:p>
-        </p:txBody>
-      </p:sp>
-    </p:spTree>
-    <p:extLst>
-      <p:ext uri="{BB962C8B-B14F-4D97-AF65-F5344CB8AC3E}">
-        <p14:creationId xmlns:p14="http://schemas.microsoft.com/office/powerpoint/2010/main" val="317803870"/>
-      </p:ext>
-    </p:extLst>
-  </p:cSld>
-  <p:clrMapOvr>
-    <a:masterClrMapping/>
-  </p:clrMapOvr>
-</p:sld>
-</file>
-
-<file path=ppt/slides/slide20.xml><?xml version="1.0" encoding="utf-8"?>
-<p:sld xmlns:a="http://schemas.openxmlformats.org/drawingml/2006/main" xmlns:r="http://schemas.openxmlformats.org/officeDocument/2006/relationships" xmlns:p="http://schemas.openxmlformats.org/presentationml/2006/main">
-  <p:cSld>
-    <p:spTree>
-      <p:nvGrpSpPr>
-        <p:cNvPr id="1" name=""/>
-        <p:cNvGrpSpPr/>
-        <p:nvPr/>
-      </p:nvGrpSpPr>
-      <p:grpSpPr>
-        <a:xfrm>
-          <a:off x="0" y="0"/>
-          <a:ext cx="0" cy="0"/>
-          <a:chOff x="0" y="0"/>
-          <a:chExt cx="0" cy="0"/>
-        </a:xfrm>
-      </p:grpSpPr>
-      <p:sp>
-        <p:nvSpPr>
-          <p:cNvPr id="2" name="Title 1">
-            <a:extLst>
-              <a:ext uri="{FF2B5EF4-FFF2-40B4-BE49-F238E27FC236}">
                 <a16:creationId xmlns:a16="http://schemas.microsoft.com/office/drawing/2014/main" id="{55D35CD2-C1AE-6945-8B31-1E78F88BC53B}"/>
               </a:ext>
             </a:extLst>
@@ -8594,7 +8767,7 @@
           <a:p>
             <a:fld id="{AE60790C-7B88-2D40-A70D-E54200C05D47}" type="slidenum">
               <a:rPr lang="en-US" smtClean="0"/>
-              <a:t>20</a:t>
+              <a:t>21</a:t>
             </a:fld>
             <a:endParaRPr lang="en-US"/>
           </a:p>
@@ -8613,7 +8786,7 @@
 </p:sld>
 </file>
 
-<file path=ppt/slides/slide21.xml><?xml version="1.0" encoding="utf-8"?>
+<file path=ppt/slides/slide22.xml><?xml version="1.0" encoding="utf-8"?>
 <p:sld xmlns:a="http://schemas.openxmlformats.org/drawingml/2006/main" xmlns:r="http://schemas.openxmlformats.org/officeDocument/2006/relationships" xmlns:p="http://schemas.openxmlformats.org/presentationml/2006/main" show="0">
   <p:cSld>
     <p:spTree>
@@ -8822,7 +8995,7 @@
           <a:p>
             <a:fld id="{AE60790C-7B88-2D40-A70D-E54200C05D47}" type="slidenum">
               <a:rPr lang="en-US" smtClean="0"/>
-              <a:t>21</a:t>
+              <a:t>22</a:t>
             </a:fld>
             <a:endParaRPr lang="en-US"/>
           </a:p>
@@ -8841,7 +9014,7 @@
 </p:sld>
 </file>
 
-<file path=ppt/slides/slide22.xml><?xml version="1.0" encoding="utf-8"?>
+<file path=ppt/slides/slide23.xml><?xml version="1.0" encoding="utf-8"?>
 <p:sld xmlns:a="http://schemas.openxmlformats.org/drawingml/2006/main" xmlns:r="http://schemas.openxmlformats.org/officeDocument/2006/relationships" xmlns:p="http://schemas.openxmlformats.org/presentationml/2006/main" show="0">
   <p:cSld>
     <p:spTree>
@@ -8980,7 +9153,7 @@
 </p:sld>
 </file>
 
-<file path=ppt/slides/slide23.xml><?xml version="1.0" encoding="utf-8"?>
+<file path=ppt/slides/slide24.xml><?xml version="1.0" encoding="utf-8"?>
 <p:sld xmlns:a="http://schemas.openxmlformats.org/drawingml/2006/main" xmlns:r="http://schemas.openxmlformats.org/officeDocument/2006/relationships" xmlns:p="http://schemas.openxmlformats.org/presentationml/2006/main" show="0">
   <p:cSld>
     <p:spTree>
@@ -9078,7 +9251,7 @@
           <a:p>
             <a:fld id="{AE60790C-7B88-2D40-A70D-E54200C05D47}" type="slidenum">
               <a:rPr lang="en-US" smtClean="0"/>
-              <a:t>23</a:t>
+              <a:t>24</a:t>
             </a:fld>
             <a:endParaRPr lang="en-US"/>
           </a:p>
@@ -10023,8 +10196,8 @@
         </p:nvSpPr>
         <p:spPr>
           <a:xfrm>
-            <a:off x="1890445" y="3061699"/>
-            <a:ext cx="791110" cy="2137025"/>
+            <a:off x="2034283" y="3010083"/>
+            <a:ext cx="657546" cy="2137025"/>
           </a:xfrm>
           <a:prstGeom prst="donut">
             <a:avLst>
@@ -10112,8 +10285,8 @@
         </p:nvSpPr>
         <p:spPr>
           <a:xfrm>
-            <a:off x="380144" y="3310650"/>
-            <a:ext cx="800219" cy="461665"/>
+            <a:off x="1496602" y="5893346"/>
+            <a:ext cx="1479892" cy="369332"/>
           </a:xfrm>
           <a:prstGeom prst="rect">
             <a:avLst/>
@@ -10140,10 +10313,12 @@
           <a:lstStyle/>
           <a:p>
             <a:r>
-              <a:rPr lang="ja-JP" altLang="en-US" sz="2400" dirty="0"/>
-              <a:t>入力</a:t>
-            </a:r>
-            <a:endParaRPr lang="en-US" sz="2400" dirty="0"/>
+              <a:rPr lang="en-US" dirty="0">
+                <a:latin typeface="Hiragino Kaku Gothic Pro W3" panose="020B0300000000000000" pitchFamily="34" charset="-128"/>
+                <a:ea typeface="Hiragino Kaku Gothic Pro W3" panose="020B0300000000000000" pitchFamily="34" charset="-128"/>
+              </a:rPr>
+              <a:t>Max polling</a:t>
+            </a:r>
           </a:p>
         </p:txBody>
       </p:sp>
@@ -10301,6 +10476,318 @@
           <a:p>
             <a:pPr algn="ctr"/>
             <a:endParaRPr lang="en-US"/>
+          </a:p>
+        </p:txBody>
+      </p:sp>
+      <p:pic>
+        <p:nvPicPr>
+          <p:cNvPr id="12" name="Picture 11">
+            <a:extLst>
+              <a:ext uri="{FF2B5EF4-FFF2-40B4-BE49-F238E27FC236}">
+                <a16:creationId xmlns:a16="http://schemas.microsoft.com/office/drawing/2014/main" id="{8E641A43-E14C-A649-96A1-28AA45F4EFBC}"/>
+              </a:ext>
+            </a:extLst>
+          </p:cNvPr>
+          <p:cNvPicPr>
+            <a:picLocks noChangeAspect="1"/>
+          </p:cNvPicPr>
+          <p:nvPr/>
+        </p:nvPicPr>
+        <p:blipFill>
+          <a:blip r:embed="rId4">
+            <a:extLst>
+              <a:ext uri="{28A0092B-C50C-407E-A947-70E740481C1C}">
+                <a14:useLocalDpi xmlns:a14="http://schemas.microsoft.com/office/drawing/2010/main" val="0"/>
+              </a:ext>
+            </a:extLst>
+          </a:blip>
+          <a:stretch>
+            <a:fillRect/>
+          </a:stretch>
+        </p:blipFill>
+        <p:spPr>
+          <a:xfrm>
+            <a:off x="376799" y="5418035"/>
+            <a:ext cx="6794939" cy="334661"/>
+          </a:xfrm>
+          <a:prstGeom prst="rect">
+            <a:avLst/>
+          </a:prstGeom>
+        </p:spPr>
+      </p:pic>
+      <p:sp>
+        <p:nvSpPr>
+          <p:cNvPr id="13" name="TextBox 12">
+            <a:extLst>
+              <a:ext uri="{FF2B5EF4-FFF2-40B4-BE49-F238E27FC236}">
+                <a16:creationId xmlns:a16="http://schemas.microsoft.com/office/drawing/2014/main" id="{B817FDD9-727C-F94A-9A9A-D982EC6E7D85}"/>
+              </a:ext>
+            </a:extLst>
+          </p:cNvPr>
+          <p:cNvSpPr txBox="1"/>
+          <p:nvPr/>
+        </p:nvSpPr>
+        <p:spPr>
+          <a:xfrm>
+            <a:off x="293994" y="5893346"/>
+            <a:ext cx="1107996" cy="369332"/>
+          </a:xfrm>
+          <a:prstGeom prst="rect">
+            <a:avLst/>
+          </a:prstGeom>
+        </p:spPr>
+        <p:style>
+          <a:lnRef idx="2">
+            <a:schemeClr val="dk1"/>
+          </a:lnRef>
+          <a:fillRef idx="1">
+            <a:schemeClr val="lt1"/>
+          </a:fillRef>
+          <a:effectRef idx="0">
+            <a:schemeClr val="dk1"/>
+          </a:effectRef>
+          <a:fontRef idx="minor">
+            <a:schemeClr val="dk1"/>
+          </a:fontRef>
+        </p:style>
+        <p:txBody>
+          <a:bodyPr wrap="none" rtlCol="0">
+            <a:spAutoFit/>
+          </a:bodyPr>
+          <a:lstStyle/>
+          <a:p>
+            <a:r>
+              <a:rPr lang="ja-JP" altLang="en-US" dirty="0">
+                <a:latin typeface="Hiragino Kaku Gothic Pro W3" panose="020B0300000000000000" pitchFamily="34" charset="-128"/>
+                <a:ea typeface="Hiragino Kaku Gothic Pro W3" panose="020B0300000000000000" pitchFamily="34" charset="-128"/>
+              </a:rPr>
+              <a:t>畳込み層</a:t>
+            </a:r>
+            <a:endParaRPr lang="en-US" dirty="0">
+              <a:latin typeface="Hiragino Kaku Gothic Pro W3" panose="020B0300000000000000" pitchFamily="34" charset="-128"/>
+              <a:ea typeface="Hiragino Kaku Gothic Pro W3" panose="020B0300000000000000" pitchFamily="34" charset="-128"/>
+            </a:endParaRPr>
+          </a:p>
+        </p:txBody>
+      </p:sp>
+      <p:sp>
+        <p:nvSpPr>
+          <p:cNvPr id="14" name="TextBox 13">
+            <a:extLst>
+              <a:ext uri="{FF2B5EF4-FFF2-40B4-BE49-F238E27FC236}">
+                <a16:creationId xmlns:a16="http://schemas.microsoft.com/office/drawing/2014/main" id="{39B373AC-3A9A-9348-B99B-349557ADBB0A}"/>
+              </a:ext>
+            </a:extLst>
+          </p:cNvPr>
+          <p:cNvSpPr txBox="1"/>
+          <p:nvPr/>
+        </p:nvSpPr>
+        <p:spPr>
+          <a:xfrm>
+            <a:off x="3071106" y="5888932"/>
+            <a:ext cx="1205779" cy="369332"/>
+          </a:xfrm>
+          <a:prstGeom prst="rect">
+            <a:avLst/>
+          </a:prstGeom>
+        </p:spPr>
+        <p:style>
+          <a:lnRef idx="2">
+            <a:schemeClr val="dk1"/>
+          </a:lnRef>
+          <a:fillRef idx="1">
+            <a:schemeClr val="lt1"/>
+          </a:fillRef>
+          <a:effectRef idx="0">
+            <a:schemeClr val="dk1"/>
+          </a:effectRef>
+          <a:fontRef idx="minor">
+            <a:schemeClr val="dk1"/>
+          </a:fontRef>
+        </p:style>
+        <p:txBody>
+          <a:bodyPr wrap="none" rtlCol="0">
+            <a:spAutoFit/>
+          </a:bodyPr>
+          <a:lstStyle/>
+          <a:p>
+            <a:r>
+              <a:rPr lang="en-US" altLang="ja-JP" dirty="0">
+                <a:latin typeface="Hiragino Kaku Gothic Pro W3" panose="020B0300000000000000" pitchFamily="34" charset="-128"/>
+                <a:ea typeface="Hiragino Kaku Gothic Pro W3" panose="020B0300000000000000" pitchFamily="34" charset="-128"/>
+              </a:rPr>
+              <a:t>Drop out</a:t>
+            </a:r>
+            <a:endParaRPr lang="en-US" dirty="0">
+              <a:latin typeface="Hiragino Kaku Gothic Pro W3" panose="020B0300000000000000" pitchFamily="34" charset="-128"/>
+              <a:ea typeface="Hiragino Kaku Gothic Pro W3" panose="020B0300000000000000" pitchFamily="34" charset="-128"/>
+            </a:endParaRPr>
+          </a:p>
+        </p:txBody>
+      </p:sp>
+      <p:sp>
+        <p:nvSpPr>
+          <p:cNvPr id="15" name="TextBox 14">
+            <a:extLst>
+              <a:ext uri="{FF2B5EF4-FFF2-40B4-BE49-F238E27FC236}">
+                <a16:creationId xmlns:a16="http://schemas.microsoft.com/office/drawing/2014/main" id="{20BFD69B-1C08-1741-B539-2DAE2F438F6B}"/>
+              </a:ext>
+            </a:extLst>
+          </p:cNvPr>
+          <p:cNvSpPr txBox="1"/>
+          <p:nvPr/>
+        </p:nvSpPr>
+        <p:spPr>
+          <a:xfrm>
+            <a:off x="4371497" y="5896253"/>
+            <a:ext cx="1729961" cy="369332"/>
+          </a:xfrm>
+          <a:prstGeom prst="rect">
+            <a:avLst/>
+          </a:prstGeom>
+        </p:spPr>
+        <p:style>
+          <a:lnRef idx="2">
+            <a:schemeClr val="dk1"/>
+          </a:lnRef>
+          <a:fillRef idx="1">
+            <a:schemeClr val="lt1"/>
+          </a:fillRef>
+          <a:effectRef idx="0">
+            <a:schemeClr val="dk1"/>
+          </a:effectRef>
+          <a:fontRef idx="minor">
+            <a:schemeClr val="dk1"/>
+          </a:fontRef>
+        </p:style>
+        <p:txBody>
+          <a:bodyPr wrap="none" rtlCol="0">
+            <a:spAutoFit/>
+          </a:bodyPr>
+          <a:lstStyle/>
+          <a:p>
+            <a:r>
+              <a:rPr lang="en-US" dirty="0">
+                <a:latin typeface="Hiragino Kaku Gothic Pro W3" panose="020B0300000000000000" pitchFamily="34" charset="-128"/>
+                <a:ea typeface="Hiragino Kaku Gothic Pro W3" panose="020B0300000000000000" pitchFamily="34" charset="-128"/>
+              </a:rPr>
+              <a:t>Depth </a:t>
+            </a:r>
+            <a:r>
+              <a:rPr lang="en-US" dirty="0" err="1">
+                <a:latin typeface="Hiragino Kaku Gothic Pro W3" panose="020B0300000000000000" pitchFamily="34" charset="-128"/>
+                <a:ea typeface="Hiragino Kaku Gothic Pro W3" panose="020B0300000000000000" pitchFamily="34" charset="-128"/>
+              </a:rPr>
+              <a:t>concat</a:t>
+            </a:r>
+            <a:endParaRPr lang="en-US" dirty="0">
+              <a:latin typeface="Hiragino Kaku Gothic Pro W3" panose="020B0300000000000000" pitchFamily="34" charset="-128"/>
+              <a:ea typeface="Hiragino Kaku Gothic Pro W3" panose="020B0300000000000000" pitchFamily="34" charset="-128"/>
+            </a:endParaRPr>
+          </a:p>
+        </p:txBody>
+      </p:sp>
+      <p:sp>
+        <p:nvSpPr>
+          <p:cNvPr id="16" name="TextBox 15">
+            <a:extLst>
+              <a:ext uri="{FF2B5EF4-FFF2-40B4-BE49-F238E27FC236}">
+                <a16:creationId xmlns:a16="http://schemas.microsoft.com/office/drawing/2014/main" id="{65BAD50B-3C14-3D4B-A264-613987D6147F}"/>
+              </a:ext>
+            </a:extLst>
+          </p:cNvPr>
+          <p:cNvSpPr txBox="1"/>
+          <p:nvPr/>
+        </p:nvSpPr>
+        <p:spPr>
+          <a:xfrm>
+            <a:off x="6196070" y="5888932"/>
+            <a:ext cx="1140056" cy="369332"/>
+          </a:xfrm>
+          <a:prstGeom prst="rect">
+            <a:avLst/>
+          </a:prstGeom>
+        </p:spPr>
+        <p:style>
+          <a:lnRef idx="2">
+            <a:schemeClr val="dk1"/>
+          </a:lnRef>
+          <a:fillRef idx="1">
+            <a:schemeClr val="lt1"/>
+          </a:fillRef>
+          <a:effectRef idx="0">
+            <a:schemeClr val="dk1"/>
+          </a:effectRef>
+          <a:fontRef idx="minor">
+            <a:schemeClr val="dk1"/>
+          </a:fontRef>
+        </p:style>
+        <p:txBody>
+          <a:bodyPr wrap="none" rtlCol="0">
+            <a:spAutoFit/>
+          </a:bodyPr>
+          <a:lstStyle/>
+          <a:p>
+            <a:r>
+              <a:rPr lang="en-US" altLang="ja-JP" dirty="0" err="1">
+                <a:latin typeface="Hiragino Kaku Gothic Pro W3" panose="020B0300000000000000" pitchFamily="34" charset="-128"/>
+                <a:ea typeface="Hiragino Kaku Gothic Pro W3" panose="020B0300000000000000" pitchFamily="34" charset="-128"/>
+              </a:rPr>
+              <a:t>Softmax</a:t>
+            </a:r>
+            <a:endParaRPr lang="en-US" dirty="0">
+              <a:latin typeface="Hiragino Kaku Gothic Pro W3" panose="020B0300000000000000" pitchFamily="34" charset="-128"/>
+              <a:ea typeface="Hiragino Kaku Gothic Pro W3" panose="020B0300000000000000" pitchFamily="34" charset="-128"/>
+            </a:endParaRPr>
+          </a:p>
+        </p:txBody>
+      </p:sp>
+      <p:sp>
+        <p:nvSpPr>
+          <p:cNvPr id="17" name="TextBox 16">
+            <a:extLst>
+              <a:ext uri="{FF2B5EF4-FFF2-40B4-BE49-F238E27FC236}">
+                <a16:creationId xmlns:a16="http://schemas.microsoft.com/office/drawing/2014/main" id="{E6CD70AE-598B-9743-B76D-CC2BAC7B1B8D}"/>
+              </a:ext>
+            </a:extLst>
+          </p:cNvPr>
+          <p:cNvSpPr txBox="1"/>
+          <p:nvPr/>
+        </p:nvSpPr>
+        <p:spPr>
+          <a:xfrm>
+            <a:off x="590328" y="3310649"/>
+            <a:ext cx="800219" cy="461665"/>
+          </a:xfrm>
+          <a:prstGeom prst="rect">
+            <a:avLst/>
+          </a:prstGeom>
+        </p:spPr>
+        <p:style>
+          <a:lnRef idx="2">
+            <a:schemeClr val="dk1"/>
+          </a:lnRef>
+          <a:fillRef idx="1">
+            <a:schemeClr val="lt1"/>
+          </a:fillRef>
+          <a:effectRef idx="0">
+            <a:schemeClr val="dk1"/>
+          </a:effectRef>
+          <a:fontRef idx="minor">
+            <a:schemeClr val="dk1"/>
+          </a:fontRef>
+        </p:style>
+        <p:txBody>
+          <a:bodyPr wrap="none" rtlCol="0">
+            <a:spAutoFit/>
+          </a:bodyPr>
+          <a:lstStyle/>
+          <a:p>
+            <a:r>
+              <a:rPr lang="ja-JP" altLang="en-US" sz="2400" dirty="0"/>
+              <a:t>入力</a:t>
+            </a:r>
+            <a:endParaRPr lang="en-US" sz="2400" dirty="0"/>
           </a:p>
         </p:txBody>
       </p:sp>

</xml_diff>